<commit_message>
The powerpoint, closer to finished
</commit_message>
<xml_diff>
--- a/Gate of GAbethulu.pptx
+++ b/Gate of GAbethulu.pptx
@@ -147,7 +147,7 @@
             <a:alphaModFix amt="30000"/>
             <a:extLst>
               <a:ext uri="{28A0092B-C50C-407E-A947-70E740481C1C}">
-                <a14:useLocalDpi xmlns:a14="http://schemas.microsoft.com/office/drawing/2010/main" xmlns="" val="0"/>
+                <a14:useLocalDpi xmlns="" xmlns:a14="http://schemas.microsoft.com/office/drawing/2010/main" val="0"/>
               </a:ext>
             </a:extLst>
           </a:blip>
@@ -167,7 +167,7 @@
           <a:noFill/>
           <a:extLst>
             <a:ext uri="{909E8E84-426E-40dd-AFC4-6F175D3DCCD1}">
-              <a14:hiddenFill xmlns="" xmlns:a14="http://schemas.microsoft.com/office/drawing/2010/main">
+              <a14:hiddenFill xmlns:a14="http://schemas.microsoft.com/office/drawing/2010/main" xmlns="">
                 <a:solidFill>
                   <a:srgbClr val="FFFFFF"/>
                 </a:solidFill>
@@ -227,7 +227,7 @@
             </a:ln>
             <a:extLst>
               <a:ext uri="{91240B29-F687-4f45-9708-019B960494DF}">
-                <a14:hiddenLine xmlns="" xmlns:a14="http://schemas.microsoft.com/office/drawing/2010/main" w="9525">
+                <a14:hiddenLine xmlns:a14="http://schemas.microsoft.com/office/drawing/2010/main" xmlns="" w="9525">
                   <a:solidFill>
                     <a:srgbClr val="000000"/>
                   </a:solidFill>
@@ -317,7 +317,7 @@
             </a:ln>
             <a:extLst>
               <a:ext uri="{91240B29-F687-4f45-9708-019B960494DF}">
-                <a14:hiddenLine xmlns="" xmlns:a14="http://schemas.microsoft.com/office/drawing/2010/main" w="9525">
+                <a14:hiddenLine xmlns:a14="http://schemas.microsoft.com/office/drawing/2010/main" xmlns="" w="9525">
                   <a:solidFill>
                     <a:srgbClr val="000000"/>
                   </a:solidFill>
@@ -407,7 +407,7 @@
             </a:ln>
             <a:extLst>
               <a:ext uri="{91240B29-F687-4f45-9708-019B960494DF}">
-                <a14:hiddenLine xmlns="" xmlns:a14="http://schemas.microsoft.com/office/drawing/2010/main" w="9525">
+                <a14:hiddenLine xmlns:a14="http://schemas.microsoft.com/office/drawing/2010/main" xmlns="" w="9525">
                   <a:solidFill>
                     <a:srgbClr val="000000"/>
                   </a:solidFill>
@@ -441,7 +441,7 @@
             </a:ln>
             <a:extLst>
               <a:ext uri="{91240B29-F687-4f45-9708-019B960494DF}">
-                <a14:hiddenLine xmlns="" xmlns:a14="http://schemas.microsoft.com/office/drawing/2010/main" w="9525">
+                <a14:hiddenLine xmlns:a14="http://schemas.microsoft.com/office/drawing/2010/main" xmlns="" w="9525">
                   <a:solidFill>
                     <a:srgbClr val="000000"/>
                   </a:solidFill>
@@ -531,7 +531,7 @@
             </a:ln>
             <a:extLst>
               <a:ext uri="{91240B29-F687-4f45-9708-019B960494DF}">
-                <a14:hiddenLine xmlns="" xmlns:a14="http://schemas.microsoft.com/office/drawing/2010/main" w="9525">
+                <a14:hiddenLine xmlns:a14="http://schemas.microsoft.com/office/drawing/2010/main" xmlns="" w="9525">
                   <a:solidFill>
                     <a:srgbClr val="000000"/>
                   </a:solidFill>
@@ -593,7 +593,7 @@
             </a:ln>
             <a:extLst>
               <a:ext uri="{91240B29-F687-4f45-9708-019B960494DF}">
-                <a14:hiddenLine xmlns="" xmlns:a14="http://schemas.microsoft.com/office/drawing/2010/main" w="9525">
+                <a14:hiddenLine xmlns:a14="http://schemas.microsoft.com/office/drawing/2010/main" xmlns="" w="9525">
                   <a:solidFill>
                     <a:srgbClr val="000000"/>
                   </a:solidFill>
@@ -655,7 +655,7 @@
             </a:ln>
             <a:extLst>
               <a:ext uri="{91240B29-F687-4f45-9708-019B960494DF}">
-                <a14:hiddenLine xmlns="" xmlns:a14="http://schemas.microsoft.com/office/drawing/2010/main" w="9525">
+                <a14:hiddenLine xmlns:a14="http://schemas.microsoft.com/office/drawing/2010/main" xmlns="" w="9525">
                   <a:solidFill>
                     <a:srgbClr val="000000"/>
                   </a:solidFill>
@@ -745,7 +745,7 @@
             </a:ln>
             <a:extLst>
               <a:ext uri="{91240B29-F687-4f45-9708-019B960494DF}">
-                <a14:hiddenLine xmlns="" xmlns:a14="http://schemas.microsoft.com/office/drawing/2010/main" w="9525">
+                <a14:hiddenLine xmlns:a14="http://schemas.microsoft.com/office/drawing/2010/main" xmlns="" w="9525">
                   <a:solidFill>
                     <a:srgbClr val="000000"/>
                   </a:solidFill>
@@ -807,7 +807,7 @@
             </a:ln>
             <a:extLst>
               <a:ext uri="{91240B29-F687-4f45-9708-019B960494DF}">
-                <a14:hiddenLine xmlns="" xmlns:a14="http://schemas.microsoft.com/office/drawing/2010/main" w="9525">
+                <a14:hiddenLine xmlns:a14="http://schemas.microsoft.com/office/drawing/2010/main" xmlns="" w="9525">
                   <a:solidFill>
                     <a:srgbClr val="000000"/>
                   </a:solidFill>
@@ -869,7 +869,7 @@
             </a:ln>
             <a:extLst>
               <a:ext uri="{91240B29-F687-4f45-9708-019B960494DF}">
-                <a14:hiddenLine xmlns="" xmlns:a14="http://schemas.microsoft.com/office/drawing/2010/main" w="9525">
+                <a14:hiddenLine xmlns:a14="http://schemas.microsoft.com/office/drawing/2010/main" xmlns="" w="9525">
                   <a:solidFill>
                     <a:srgbClr val="000000"/>
                   </a:solidFill>
@@ -959,7 +959,7 @@
             </a:ln>
             <a:extLst>
               <a:ext uri="{91240B29-F687-4f45-9708-019B960494DF}">
-                <a14:hiddenLine xmlns="" xmlns:a14="http://schemas.microsoft.com/office/drawing/2010/main" w="9525">
+                <a14:hiddenLine xmlns:a14="http://schemas.microsoft.com/office/drawing/2010/main" xmlns="" w="9525">
                   <a:solidFill>
                     <a:srgbClr val="000000"/>
                   </a:solidFill>
@@ -1049,7 +1049,7 @@
             </a:ln>
             <a:extLst>
               <a:ext uri="{91240B29-F687-4f45-9708-019B960494DF}">
-                <a14:hiddenLine xmlns="" xmlns:a14="http://schemas.microsoft.com/office/drawing/2010/main" w="9525">
+                <a14:hiddenLine xmlns:a14="http://schemas.microsoft.com/office/drawing/2010/main" xmlns="" w="9525">
                   <a:solidFill>
                     <a:srgbClr val="000000"/>
                   </a:solidFill>
@@ -1111,7 +1111,7 @@
             </a:ln>
             <a:extLst>
               <a:ext uri="{91240B29-F687-4f45-9708-019B960494DF}">
-                <a14:hiddenLine xmlns="" xmlns:a14="http://schemas.microsoft.com/office/drawing/2010/main" w="9525">
+                <a14:hiddenLine xmlns:a14="http://schemas.microsoft.com/office/drawing/2010/main" xmlns="" w="9525">
                   <a:solidFill>
                     <a:srgbClr val="000000"/>
                   </a:solidFill>
@@ -1221,7 +1221,7 @@
             </a:ln>
             <a:extLst>
               <a:ext uri="{91240B29-F687-4f45-9708-019B960494DF}">
-                <a14:hiddenLine xmlns="" xmlns:a14="http://schemas.microsoft.com/office/drawing/2010/main" w="9525">
+                <a14:hiddenLine xmlns:a14="http://schemas.microsoft.com/office/drawing/2010/main" xmlns="" w="9525">
                   <a:solidFill>
                     <a:srgbClr val="000000"/>
                   </a:solidFill>
@@ -1283,7 +1283,7 @@
             </a:ln>
             <a:extLst>
               <a:ext uri="{91240B29-F687-4f45-9708-019B960494DF}">
-                <a14:hiddenLine xmlns="" xmlns:a14="http://schemas.microsoft.com/office/drawing/2010/main" w="9525">
+                <a14:hiddenLine xmlns:a14="http://schemas.microsoft.com/office/drawing/2010/main" xmlns="" w="9525">
                   <a:solidFill>
                     <a:srgbClr val="000000"/>
                   </a:solidFill>
@@ -1373,7 +1373,7 @@
             </a:ln>
             <a:extLst>
               <a:ext uri="{91240B29-F687-4f45-9708-019B960494DF}">
-                <a14:hiddenLine xmlns="" xmlns:a14="http://schemas.microsoft.com/office/drawing/2010/main" w="9525">
+                <a14:hiddenLine xmlns:a14="http://schemas.microsoft.com/office/drawing/2010/main" xmlns="" w="9525">
                   <a:solidFill>
                     <a:srgbClr val="000000"/>
                   </a:solidFill>
@@ -1463,7 +1463,7 @@
             </a:ln>
             <a:extLst>
               <a:ext uri="{91240B29-F687-4f45-9708-019B960494DF}">
-                <a14:hiddenLine xmlns="" xmlns:a14="http://schemas.microsoft.com/office/drawing/2010/main" w="9525">
+                <a14:hiddenLine xmlns:a14="http://schemas.microsoft.com/office/drawing/2010/main" xmlns="" w="9525">
                   <a:solidFill>
                     <a:srgbClr val="000000"/>
                   </a:solidFill>
@@ -1525,7 +1525,7 @@
             </a:ln>
             <a:extLst>
               <a:ext uri="{91240B29-F687-4f45-9708-019B960494DF}">
-                <a14:hiddenLine xmlns="" xmlns:a14="http://schemas.microsoft.com/office/drawing/2010/main" w="9525">
+                <a14:hiddenLine xmlns:a14="http://schemas.microsoft.com/office/drawing/2010/main" xmlns="" w="9525">
                   <a:solidFill>
                     <a:srgbClr val="000000"/>
                   </a:solidFill>
@@ -1615,7 +1615,7 @@
             </a:ln>
             <a:extLst>
               <a:ext uri="{91240B29-F687-4f45-9708-019B960494DF}">
-                <a14:hiddenLine xmlns="" xmlns:a14="http://schemas.microsoft.com/office/drawing/2010/main" w="9525">
+                <a14:hiddenLine xmlns:a14="http://schemas.microsoft.com/office/drawing/2010/main" xmlns="" w="9525">
                   <a:solidFill>
                     <a:srgbClr val="000000"/>
                   </a:solidFill>
@@ -1705,7 +1705,7 @@
             </a:ln>
             <a:extLst>
               <a:ext uri="{91240B29-F687-4f45-9708-019B960494DF}">
-                <a14:hiddenLine xmlns="" xmlns:a14="http://schemas.microsoft.com/office/drawing/2010/main" w="9525">
+                <a14:hiddenLine xmlns:a14="http://schemas.microsoft.com/office/drawing/2010/main" xmlns="" w="9525">
                   <a:solidFill>
                     <a:srgbClr val="000000"/>
                   </a:solidFill>
@@ -1761,7 +1761,7 @@
             </a:ln>
             <a:extLst>
               <a:ext uri="{91240B29-F687-4f45-9708-019B960494DF}">
-                <a14:hiddenLine xmlns="" xmlns:a14="http://schemas.microsoft.com/office/drawing/2010/main" w="9525">
+                <a14:hiddenLine xmlns:a14="http://schemas.microsoft.com/office/drawing/2010/main" xmlns="" w="9525">
                   <a:solidFill>
                     <a:srgbClr val="000000"/>
                   </a:solidFill>
@@ -1851,7 +1851,7 @@
             </a:ln>
             <a:extLst>
               <a:ext uri="{91240B29-F687-4f45-9708-019B960494DF}">
-                <a14:hiddenLine xmlns="" xmlns:a14="http://schemas.microsoft.com/office/drawing/2010/main" w="9525">
+                <a14:hiddenLine xmlns:a14="http://schemas.microsoft.com/office/drawing/2010/main" xmlns="" w="9525">
                   <a:solidFill>
                     <a:srgbClr val="000000"/>
                   </a:solidFill>
@@ -1907,7 +1907,7 @@
             </a:ln>
             <a:extLst>
               <a:ext uri="{91240B29-F687-4f45-9708-019B960494DF}">
-                <a14:hiddenLine xmlns="" xmlns:a14="http://schemas.microsoft.com/office/drawing/2010/main" w="9525">
+                <a14:hiddenLine xmlns:a14="http://schemas.microsoft.com/office/drawing/2010/main" xmlns="" w="9525">
                   <a:solidFill>
                     <a:srgbClr val="000000"/>
                   </a:solidFill>
@@ -1997,7 +1997,7 @@
             </a:ln>
             <a:extLst>
               <a:ext uri="{91240B29-F687-4f45-9708-019B960494DF}">
-                <a14:hiddenLine xmlns="" xmlns:a14="http://schemas.microsoft.com/office/drawing/2010/main" w="9525">
+                <a14:hiddenLine xmlns:a14="http://schemas.microsoft.com/office/drawing/2010/main" xmlns="" w="9525">
                   <a:solidFill>
                     <a:srgbClr val="000000"/>
                   </a:solidFill>
@@ -2065,7 +2065,7 @@
             </a:ln>
             <a:extLst>
               <a:ext uri="{91240B29-F687-4f45-9708-019B960494DF}">
-                <a14:hiddenLine xmlns="" xmlns:a14="http://schemas.microsoft.com/office/drawing/2010/main" w="9525">
+                <a14:hiddenLine xmlns:a14="http://schemas.microsoft.com/office/drawing/2010/main" xmlns="" w="9525">
                   <a:solidFill>
                     <a:srgbClr val="000000"/>
                   </a:solidFill>
@@ -2155,7 +2155,7 @@
             </a:ln>
             <a:extLst>
               <a:ext uri="{91240B29-F687-4f45-9708-019B960494DF}">
-                <a14:hiddenLine xmlns="" xmlns:a14="http://schemas.microsoft.com/office/drawing/2010/main" w="9525">
+                <a14:hiddenLine xmlns:a14="http://schemas.microsoft.com/office/drawing/2010/main" xmlns="" w="9525">
                   <a:solidFill>
                     <a:srgbClr val="000000"/>
                   </a:solidFill>
@@ -2223,7 +2223,7 @@
             </a:ln>
             <a:extLst>
               <a:ext uri="{91240B29-F687-4f45-9708-019B960494DF}">
-                <a14:hiddenLine xmlns="" xmlns:a14="http://schemas.microsoft.com/office/drawing/2010/main" w="9525">
+                <a14:hiddenLine xmlns:a14="http://schemas.microsoft.com/office/drawing/2010/main" xmlns="" w="9525">
                   <a:solidFill>
                     <a:srgbClr val="000000"/>
                   </a:solidFill>
@@ -2313,7 +2313,7 @@
             </a:ln>
             <a:extLst>
               <a:ext uri="{91240B29-F687-4f45-9708-019B960494DF}">
-                <a14:hiddenLine xmlns="" xmlns:a14="http://schemas.microsoft.com/office/drawing/2010/main" w="9525">
+                <a14:hiddenLine xmlns:a14="http://schemas.microsoft.com/office/drawing/2010/main" xmlns="" w="9525">
                   <a:solidFill>
                     <a:srgbClr val="000000"/>
                   </a:solidFill>
@@ -2347,7 +2347,7 @@
             </a:ln>
             <a:extLst>
               <a:ext uri="{91240B29-F687-4f45-9708-019B960494DF}">
-                <a14:hiddenLine xmlns="" xmlns:a14="http://schemas.microsoft.com/office/drawing/2010/main" w="9525">
+                <a14:hiddenLine xmlns:a14="http://schemas.microsoft.com/office/drawing/2010/main" xmlns="" w="9525">
                   <a:solidFill>
                     <a:srgbClr val="000000"/>
                   </a:solidFill>
@@ -2437,7 +2437,7 @@
             </a:ln>
             <a:extLst>
               <a:ext uri="{91240B29-F687-4f45-9708-019B960494DF}">
-                <a14:hiddenLine xmlns="" xmlns:a14="http://schemas.microsoft.com/office/drawing/2010/main" w="9525">
+                <a14:hiddenLine xmlns:a14="http://schemas.microsoft.com/office/drawing/2010/main" xmlns="" w="9525">
                   <a:solidFill>
                     <a:srgbClr val="000000"/>
                   </a:solidFill>
@@ -2499,7 +2499,7 @@
             </a:ln>
             <a:extLst>
               <a:ext uri="{91240B29-F687-4f45-9708-019B960494DF}">
-                <a14:hiddenLine xmlns="" xmlns:a14="http://schemas.microsoft.com/office/drawing/2010/main" w="9525">
+                <a14:hiddenLine xmlns:a14="http://schemas.microsoft.com/office/drawing/2010/main" xmlns="" w="9525">
                   <a:solidFill>
                     <a:srgbClr val="000000"/>
                   </a:solidFill>
@@ -2561,7 +2561,7 @@
             </a:ln>
             <a:extLst>
               <a:ext uri="{91240B29-F687-4f45-9708-019B960494DF}">
-                <a14:hiddenLine xmlns="" xmlns:a14="http://schemas.microsoft.com/office/drawing/2010/main" w="9525">
+                <a14:hiddenLine xmlns:a14="http://schemas.microsoft.com/office/drawing/2010/main" xmlns="" w="9525">
                   <a:solidFill>
                     <a:srgbClr val="000000"/>
                   </a:solidFill>
@@ -2651,7 +2651,7 @@
             </a:ln>
             <a:extLst>
               <a:ext uri="{91240B29-F687-4f45-9708-019B960494DF}">
-                <a14:hiddenLine xmlns="" xmlns:a14="http://schemas.microsoft.com/office/drawing/2010/main" w="9525">
+                <a14:hiddenLine xmlns:a14="http://schemas.microsoft.com/office/drawing/2010/main" xmlns="" w="9525">
                   <a:solidFill>
                     <a:srgbClr val="000000"/>
                   </a:solidFill>
@@ -2719,7 +2719,7 @@
             </a:ln>
             <a:extLst>
               <a:ext uri="{91240B29-F687-4f45-9708-019B960494DF}">
-                <a14:hiddenLine xmlns="" xmlns:a14="http://schemas.microsoft.com/office/drawing/2010/main" w="9525">
+                <a14:hiddenLine xmlns:a14="http://schemas.microsoft.com/office/drawing/2010/main" xmlns="" w="9525">
                   <a:solidFill>
                     <a:srgbClr val="000000"/>
                   </a:solidFill>
@@ -2781,7 +2781,7 @@
             </a:ln>
             <a:extLst>
               <a:ext uri="{91240B29-F687-4f45-9708-019B960494DF}">
-                <a14:hiddenLine xmlns="" xmlns:a14="http://schemas.microsoft.com/office/drawing/2010/main" w="9525">
+                <a14:hiddenLine xmlns:a14="http://schemas.microsoft.com/office/drawing/2010/main" xmlns="" w="9525">
                   <a:solidFill>
                     <a:srgbClr val="000000"/>
                   </a:solidFill>
@@ -2871,7 +2871,7 @@
             </a:ln>
             <a:extLst>
               <a:ext uri="{91240B29-F687-4f45-9708-019B960494DF}">
-                <a14:hiddenLine xmlns="" xmlns:a14="http://schemas.microsoft.com/office/drawing/2010/main" w="9525">
+                <a14:hiddenLine xmlns:a14="http://schemas.microsoft.com/office/drawing/2010/main" xmlns="" w="9525">
                   <a:solidFill>
                     <a:srgbClr val="000000"/>
                   </a:solidFill>
@@ -2933,7 +2933,7 @@
             </a:ln>
             <a:extLst>
               <a:ext uri="{91240B29-F687-4f45-9708-019B960494DF}">
-                <a14:hiddenLine xmlns="" xmlns:a14="http://schemas.microsoft.com/office/drawing/2010/main" w="9525">
+                <a14:hiddenLine xmlns:a14="http://schemas.microsoft.com/office/drawing/2010/main" xmlns="" w="9525">
                   <a:solidFill>
                     <a:srgbClr val="000000"/>
                   </a:solidFill>
@@ -3023,7 +3023,7 @@
             </a:ln>
             <a:extLst>
               <a:ext uri="{91240B29-F687-4f45-9708-019B960494DF}">
-                <a14:hiddenLine xmlns="" xmlns:a14="http://schemas.microsoft.com/office/drawing/2010/main" w="9525">
+                <a14:hiddenLine xmlns:a14="http://schemas.microsoft.com/office/drawing/2010/main" xmlns="" w="9525">
                   <a:solidFill>
                     <a:srgbClr val="000000"/>
                   </a:solidFill>
@@ -3085,7 +3085,7 @@
             </a:ln>
             <a:extLst>
               <a:ext uri="{91240B29-F687-4f45-9708-019B960494DF}">
-                <a14:hiddenLine xmlns="" xmlns:a14="http://schemas.microsoft.com/office/drawing/2010/main" w="9525">
+                <a14:hiddenLine xmlns:a14="http://schemas.microsoft.com/office/drawing/2010/main" xmlns="" w="9525">
                   <a:solidFill>
                     <a:srgbClr val="000000"/>
                   </a:solidFill>
@@ -3175,7 +3175,7 @@
             </a:ln>
             <a:extLst>
               <a:ext uri="{91240B29-F687-4f45-9708-019B960494DF}">
-                <a14:hiddenLine xmlns="" xmlns:a14="http://schemas.microsoft.com/office/drawing/2010/main" w="9525">
+                <a14:hiddenLine xmlns:a14="http://schemas.microsoft.com/office/drawing/2010/main" xmlns="" w="9525">
                   <a:solidFill>
                     <a:srgbClr val="000000"/>
                   </a:solidFill>
@@ -3209,7 +3209,7 @@
             </a:ln>
             <a:extLst>
               <a:ext uri="{91240B29-F687-4f45-9708-019B960494DF}">
-                <a14:hiddenLine xmlns="" xmlns:a14="http://schemas.microsoft.com/office/drawing/2010/main" w="9525">
+                <a14:hiddenLine xmlns:a14="http://schemas.microsoft.com/office/drawing/2010/main" xmlns="" w="9525">
                   <a:solidFill>
                     <a:srgbClr val="000000"/>
                   </a:solidFill>
@@ -3274,7 +3274,7 @@
             </a:ln>
             <a:extLst>
               <a:ext uri="{91240B29-F687-4f45-9708-019B960494DF}">
-                <a14:hiddenLine xmlns="" xmlns:a14="http://schemas.microsoft.com/office/drawing/2010/main" w="9525">
+                <a14:hiddenLine xmlns:a14="http://schemas.microsoft.com/office/drawing/2010/main" xmlns="" w="9525">
                   <a:solidFill>
                     <a:srgbClr val="000000"/>
                   </a:solidFill>
@@ -3364,7 +3364,7 @@
             </a:ln>
             <a:extLst>
               <a:ext uri="{91240B29-F687-4f45-9708-019B960494DF}">
-                <a14:hiddenLine xmlns="" xmlns:a14="http://schemas.microsoft.com/office/drawing/2010/main" w="9525">
+                <a14:hiddenLine xmlns:a14="http://schemas.microsoft.com/office/drawing/2010/main" xmlns="" w="9525">
                   <a:solidFill>
                     <a:srgbClr val="000000"/>
                   </a:solidFill>
@@ -3426,7 +3426,7 @@
             </a:ln>
             <a:extLst>
               <a:ext uri="{91240B29-F687-4f45-9708-019B960494DF}">
-                <a14:hiddenLine xmlns="" xmlns:a14="http://schemas.microsoft.com/office/drawing/2010/main" w="9525">
+                <a14:hiddenLine xmlns:a14="http://schemas.microsoft.com/office/drawing/2010/main" xmlns="" w="9525">
                   <a:solidFill>
                     <a:srgbClr val="000000"/>
                   </a:solidFill>
@@ -3516,7 +3516,7 @@
             </a:ln>
             <a:extLst>
               <a:ext uri="{91240B29-F687-4f45-9708-019B960494DF}">
-                <a14:hiddenLine xmlns="" xmlns:a14="http://schemas.microsoft.com/office/drawing/2010/main" w="9525">
+                <a14:hiddenLine xmlns:a14="http://schemas.microsoft.com/office/drawing/2010/main" xmlns="" w="9525">
                   <a:solidFill>
                     <a:srgbClr val="000000"/>
                   </a:solidFill>
@@ -3606,7 +3606,7 @@
             </a:ln>
             <a:extLst>
               <a:ext uri="{91240B29-F687-4f45-9708-019B960494DF}">
-                <a14:hiddenLine xmlns="" xmlns:a14="http://schemas.microsoft.com/office/drawing/2010/main" w="9525">
+                <a14:hiddenLine xmlns:a14="http://schemas.microsoft.com/office/drawing/2010/main" xmlns="" w="9525">
                   <a:solidFill>
                     <a:srgbClr val="000000"/>
                   </a:solidFill>
@@ -3671,7 +3671,7 @@
             </a:ln>
             <a:extLst>
               <a:ext uri="{91240B29-F687-4f45-9708-019B960494DF}">
-                <a14:hiddenLine xmlns="" xmlns:a14="http://schemas.microsoft.com/office/drawing/2010/main" w="9525">
+                <a14:hiddenLine xmlns:a14="http://schemas.microsoft.com/office/drawing/2010/main" xmlns="" w="9525">
                   <a:solidFill>
                     <a:srgbClr val="000000"/>
                   </a:solidFill>
@@ -3733,7 +3733,7 @@
             </a:ln>
             <a:extLst>
               <a:ext uri="{91240B29-F687-4f45-9708-019B960494DF}">
-                <a14:hiddenLine xmlns="" xmlns:a14="http://schemas.microsoft.com/office/drawing/2010/main" w="9525">
+                <a14:hiddenLine xmlns:a14="http://schemas.microsoft.com/office/drawing/2010/main" xmlns="" w="9525">
                   <a:solidFill>
                     <a:srgbClr val="000000"/>
                   </a:solidFill>
@@ -3823,7 +3823,7 @@
             </a:ln>
             <a:extLst>
               <a:ext uri="{91240B29-F687-4f45-9708-019B960494DF}">
-                <a14:hiddenLine xmlns="" xmlns:a14="http://schemas.microsoft.com/office/drawing/2010/main" w="9525">
+                <a14:hiddenLine xmlns:a14="http://schemas.microsoft.com/office/drawing/2010/main" xmlns="" w="9525">
                   <a:solidFill>
                     <a:srgbClr val="000000"/>
                   </a:solidFill>
@@ -3913,7 +3913,7 @@
             </a:ln>
             <a:extLst>
               <a:ext uri="{91240B29-F687-4f45-9708-019B960494DF}">
-                <a14:hiddenLine xmlns="" xmlns:a14="http://schemas.microsoft.com/office/drawing/2010/main" w="9525">
+                <a14:hiddenLine xmlns:a14="http://schemas.microsoft.com/office/drawing/2010/main" xmlns="" w="9525">
                   <a:solidFill>
                     <a:srgbClr val="000000"/>
                   </a:solidFill>
@@ -3975,7 +3975,7 @@
             </a:ln>
             <a:extLst>
               <a:ext uri="{91240B29-F687-4f45-9708-019B960494DF}">
-                <a14:hiddenLine xmlns="" xmlns:a14="http://schemas.microsoft.com/office/drawing/2010/main" w="9525">
+                <a14:hiddenLine xmlns:a14="http://schemas.microsoft.com/office/drawing/2010/main" xmlns="" w="9525">
                   <a:solidFill>
                     <a:srgbClr val="000000"/>
                   </a:solidFill>
@@ -4095,7 +4095,7 @@
             </a:ln>
             <a:extLst>
               <a:ext uri="{91240B29-F687-4f45-9708-019B960494DF}">
-                <a14:hiddenLine xmlns="" xmlns:a14="http://schemas.microsoft.com/office/drawing/2010/main" w="9525">
+                <a14:hiddenLine xmlns:a14="http://schemas.microsoft.com/office/drawing/2010/main" xmlns="" w="9525">
                   <a:solidFill>
                     <a:srgbClr val="000000"/>
                   </a:solidFill>
@@ -4163,7 +4163,7 @@
             </a:ln>
             <a:extLst>
               <a:ext uri="{91240B29-F687-4f45-9708-019B960494DF}">
-                <a14:hiddenLine xmlns="" xmlns:a14="http://schemas.microsoft.com/office/drawing/2010/main" w="9525">
+                <a14:hiddenLine xmlns:a14="http://schemas.microsoft.com/office/drawing/2010/main" xmlns="" w="9525">
                   <a:solidFill>
                     <a:srgbClr val="000000"/>
                   </a:solidFill>
@@ -4253,7 +4253,7 @@
             </a:ln>
             <a:extLst>
               <a:ext uri="{91240B29-F687-4f45-9708-019B960494DF}">
-                <a14:hiddenLine xmlns="" xmlns:a14="http://schemas.microsoft.com/office/drawing/2010/main" w="9525">
+                <a14:hiddenLine xmlns:a14="http://schemas.microsoft.com/office/drawing/2010/main" xmlns="" w="9525">
                   <a:solidFill>
                     <a:srgbClr val="000000"/>
                   </a:solidFill>
@@ -8989,7 +8989,7 @@
             <a:alphaModFix amt="30000"/>
             <a:extLst>
               <a:ext uri="{28A0092B-C50C-407E-A947-70E740481C1C}">
-                <a14:useLocalDpi xmlns:a14="http://schemas.microsoft.com/office/drawing/2010/main" xmlns="" val="0"/>
+                <a14:useLocalDpi xmlns="" xmlns:a14="http://schemas.microsoft.com/office/drawing/2010/main" val="0"/>
               </a:ext>
             </a:extLst>
           </a:blip>
@@ -9009,7 +9009,7 @@
           <a:noFill/>
           <a:extLst>
             <a:ext uri="{909E8E84-426E-40dd-AFC4-6F175D3DCCD1}">
-              <a14:hiddenFill xmlns="" xmlns:a14="http://schemas.microsoft.com/office/drawing/2010/main">
+              <a14:hiddenFill xmlns:a14="http://schemas.microsoft.com/office/drawing/2010/main" xmlns="">
                 <a:solidFill>
                   <a:srgbClr val="FFFFFF"/>
                 </a:solidFill>
@@ -9083,7 +9083,7 @@
               </a:ln>
               <a:extLst>
                 <a:ext uri="{91240B29-F687-4f45-9708-019B960494DF}">
-                  <a14:hiddenLine xmlns="" xmlns:a14="http://schemas.microsoft.com/office/drawing/2010/main" w="9525">
+                  <a14:hiddenLine xmlns:a14="http://schemas.microsoft.com/office/drawing/2010/main" xmlns="" w="9525">
                     <a:solidFill>
                       <a:srgbClr val="000000"/>
                     </a:solidFill>
@@ -9173,7 +9173,7 @@
               </a:ln>
               <a:extLst>
                 <a:ext uri="{91240B29-F687-4f45-9708-019B960494DF}">
-                  <a14:hiddenLine xmlns="" xmlns:a14="http://schemas.microsoft.com/office/drawing/2010/main" w="9525">
+                  <a14:hiddenLine xmlns:a14="http://schemas.microsoft.com/office/drawing/2010/main" xmlns="" w="9525">
                     <a:solidFill>
                       <a:srgbClr val="000000"/>
                     </a:solidFill>
@@ -9263,7 +9263,7 @@
               </a:ln>
               <a:extLst>
                 <a:ext uri="{91240B29-F687-4f45-9708-019B960494DF}">
-                  <a14:hiddenLine xmlns="" xmlns:a14="http://schemas.microsoft.com/office/drawing/2010/main" w="9525">
+                  <a14:hiddenLine xmlns:a14="http://schemas.microsoft.com/office/drawing/2010/main" xmlns="" w="9525">
                     <a:solidFill>
                       <a:srgbClr val="000000"/>
                     </a:solidFill>
@@ -9325,7 +9325,7 @@
               </a:ln>
               <a:extLst>
                 <a:ext uri="{91240B29-F687-4f45-9708-019B960494DF}">
-                  <a14:hiddenLine xmlns="" xmlns:a14="http://schemas.microsoft.com/office/drawing/2010/main" w="9525">
+                  <a14:hiddenLine xmlns:a14="http://schemas.microsoft.com/office/drawing/2010/main" xmlns="" w="9525">
                     <a:solidFill>
                       <a:srgbClr val="000000"/>
                     </a:solidFill>
@@ -9415,7 +9415,7 @@
               </a:ln>
               <a:extLst>
                 <a:ext uri="{91240B29-F687-4f45-9708-019B960494DF}">
-                  <a14:hiddenLine xmlns="" xmlns:a14="http://schemas.microsoft.com/office/drawing/2010/main" w="9525">
+                  <a14:hiddenLine xmlns:a14="http://schemas.microsoft.com/office/drawing/2010/main" xmlns="" w="9525">
                     <a:solidFill>
                       <a:srgbClr val="000000"/>
                     </a:solidFill>
@@ -9477,7 +9477,7 @@
               </a:ln>
               <a:extLst>
                 <a:ext uri="{91240B29-F687-4f45-9708-019B960494DF}">
-                  <a14:hiddenLine xmlns="" xmlns:a14="http://schemas.microsoft.com/office/drawing/2010/main" w="9525">
+                  <a14:hiddenLine xmlns:a14="http://schemas.microsoft.com/office/drawing/2010/main" xmlns="" w="9525">
                     <a:solidFill>
                       <a:srgbClr val="000000"/>
                     </a:solidFill>
@@ -9539,7 +9539,7 @@
               </a:ln>
               <a:extLst>
                 <a:ext uri="{91240B29-F687-4f45-9708-019B960494DF}">
-                  <a14:hiddenLine xmlns="" xmlns:a14="http://schemas.microsoft.com/office/drawing/2010/main" w="9525">
+                  <a14:hiddenLine xmlns:a14="http://schemas.microsoft.com/office/drawing/2010/main" xmlns="" w="9525">
                     <a:solidFill>
                       <a:srgbClr val="000000"/>
                     </a:solidFill>
@@ -9629,7 +9629,7 @@
               </a:ln>
               <a:extLst>
                 <a:ext uri="{91240B29-F687-4f45-9708-019B960494DF}">
-                  <a14:hiddenLine xmlns="" xmlns:a14="http://schemas.microsoft.com/office/drawing/2010/main" w="9525">
+                  <a14:hiddenLine xmlns:a14="http://schemas.microsoft.com/office/drawing/2010/main" xmlns="" w="9525">
                     <a:solidFill>
                       <a:srgbClr val="000000"/>
                     </a:solidFill>
@@ -9719,7 +9719,7 @@
               </a:ln>
               <a:extLst>
                 <a:ext uri="{91240B29-F687-4f45-9708-019B960494DF}">
-                  <a14:hiddenLine xmlns="" xmlns:a14="http://schemas.microsoft.com/office/drawing/2010/main" w="9525">
+                  <a14:hiddenLine xmlns:a14="http://schemas.microsoft.com/office/drawing/2010/main" xmlns="" w="9525">
                     <a:solidFill>
                       <a:srgbClr val="000000"/>
                     </a:solidFill>
@@ -9781,7 +9781,7 @@
               </a:ln>
               <a:extLst>
                 <a:ext uri="{91240B29-F687-4f45-9708-019B960494DF}">
-                  <a14:hiddenLine xmlns="" xmlns:a14="http://schemas.microsoft.com/office/drawing/2010/main" w="9525">
+                  <a14:hiddenLine xmlns:a14="http://schemas.microsoft.com/office/drawing/2010/main" xmlns="" w="9525">
                     <a:solidFill>
                       <a:srgbClr val="000000"/>
                     </a:solidFill>
@@ -9891,7 +9891,7 @@
               </a:ln>
               <a:extLst>
                 <a:ext uri="{91240B29-F687-4f45-9708-019B960494DF}">
-                  <a14:hiddenLine xmlns="" xmlns:a14="http://schemas.microsoft.com/office/drawing/2010/main" w="9525">
+                  <a14:hiddenLine xmlns:a14="http://schemas.microsoft.com/office/drawing/2010/main" xmlns="" w="9525">
                     <a:solidFill>
                       <a:srgbClr val="000000"/>
                     </a:solidFill>
@@ -9975,7 +9975,7 @@
               </a:ln>
               <a:extLst>
                 <a:ext uri="{91240B29-F687-4f45-9708-019B960494DF}">
-                  <a14:hiddenLine xmlns="" xmlns:a14="http://schemas.microsoft.com/office/drawing/2010/main" w="9525">
+                  <a14:hiddenLine xmlns:a14="http://schemas.microsoft.com/office/drawing/2010/main" xmlns="" w="9525">
                     <a:solidFill>
                       <a:srgbClr val="000000"/>
                     </a:solidFill>
@@ -10037,7 +10037,7 @@
               </a:ln>
               <a:extLst>
                 <a:ext uri="{91240B29-F687-4f45-9708-019B960494DF}">
-                  <a14:hiddenLine xmlns="" xmlns:a14="http://schemas.microsoft.com/office/drawing/2010/main" w="9525">
+                  <a14:hiddenLine xmlns:a14="http://schemas.microsoft.com/office/drawing/2010/main" xmlns="" w="9525">
                     <a:solidFill>
                       <a:srgbClr val="000000"/>
                     </a:solidFill>
@@ -10099,7 +10099,7 @@
               </a:ln>
               <a:extLst>
                 <a:ext uri="{91240B29-F687-4f45-9708-019B960494DF}">
-                  <a14:hiddenLine xmlns="" xmlns:a14="http://schemas.microsoft.com/office/drawing/2010/main" w="9525">
+                  <a14:hiddenLine xmlns:a14="http://schemas.microsoft.com/office/drawing/2010/main" xmlns="" w="9525">
                     <a:solidFill>
                       <a:srgbClr val="000000"/>
                     </a:solidFill>
@@ -10189,7 +10189,7 @@
               </a:ln>
               <a:extLst>
                 <a:ext uri="{91240B29-F687-4f45-9708-019B960494DF}">
-                  <a14:hiddenLine xmlns="" xmlns:a14="http://schemas.microsoft.com/office/drawing/2010/main" w="9525">
+                  <a14:hiddenLine xmlns:a14="http://schemas.microsoft.com/office/drawing/2010/main" xmlns="" w="9525">
                     <a:solidFill>
                       <a:srgbClr val="000000"/>
                     </a:solidFill>
@@ -10223,7 +10223,7 @@
               </a:ln>
               <a:extLst>
                 <a:ext uri="{91240B29-F687-4f45-9708-019B960494DF}">
-                  <a14:hiddenLine xmlns="" xmlns:a14="http://schemas.microsoft.com/office/drawing/2010/main" w="9525">
+                  <a14:hiddenLine xmlns:a14="http://schemas.microsoft.com/office/drawing/2010/main" xmlns="" w="9525">
                     <a:solidFill>
                       <a:srgbClr val="000000"/>
                     </a:solidFill>
@@ -10288,7 +10288,7 @@
               </a:ln>
               <a:extLst>
                 <a:ext uri="{91240B29-F687-4f45-9708-019B960494DF}">
-                  <a14:hiddenLine xmlns="" xmlns:a14="http://schemas.microsoft.com/office/drawing/2010/main" w="9525">
+                  <a14:hiddenLine xmlns:a14="http://schemas.microsoft.com/office/drawing/2010/main" xmlns="" w="9525">
                     <a:solidFill>
                       <a:srgbClr val="000000"/>
                     </a:solidFill>
@@ -10378,7 +10378,7 @@
               </a:ln>
               <a:extLst>
                 <a:ext uri="{91240B29-F687-4f45-9708-019B960494DF}">
-                  <a14:hiddenLine xmlns="" xmlns:a14="http://schemas.microsoft.com/office/drawing/2010/main" w="9525">
+                  <a14:hiddenLine xmlns:a14="http://schemas.microsoft.com/office/drawing/2010/main" xmlns="" w="9525">
                     <a:solidFill>
                       <a:srgbClr val="000000"/>
                     </a:solidFill>
@@ -10440,7 +10440,7 @@
               </a:ln>
               <a:extLst>
                 <a:ext uri="{91240B29-F687-4f45-9708-019B960494DF}">
-                  <a14:hiddenLine xmlns="" xmlns:a14="http://schemas.microsoft.com/office/drawing/2010/main" w="9525">
+                  <a14:hiddenLine xmlns:a14="http://schemas.microsoft.com/office/drawing/2010/main" xmlns="" w="9525">
                     <a:solidFill>
                       <a:srgbClr val="000000"/>
                     </a:solidFill>
@@ -10530,7 +10530,7 @@
               </a:ln>
               <a:extLst>
                 <a:ext uri="{91240B29-F687-4f45-9708-019B960494DF}">
-                  <a14:hiddenLine xmlns="" xmlns:a14="http://schemas.microsoft.com/office/drawing/2010/main" w="9525">
+                  <a14:hiddenLine xmlns:a14="http://schemas.microsoft.com/office/drawing/2010/main" xmlns="" w="9525">
                     <a:solidFill>
                       <a:srgbClr val="000000"/>
                     </a:solidFill>
@@ -10595,7 +10595,7 @@
               </a:ln>
               <a:extLst>
                 <a:ext uri="{91240B29-F687-4f45-9708-019B960494DF}">
-                  <a14:hiddenLine xmlns="" xmlns:a14="http://schemas.microsoft.com/office/drawing/2010/main" w="9525">
+                  <a14:hiddenLine xmlns:a14="http://schemas.microsoft.com/office/drawing/2010/main" xmlns="" w="9525">
                     <a:solidFill>
                       <a:srgbClr val="000000"/>
                     </a:solidFill>
@@ -10657,7 +10657,7 @@
               </a:ln>
               <a:extLst>
                 <a:ext uri="{91240B29-F687-4f45-9708-019B960494DF}">
-                  <a14:hiddenLine xmlns="" xmlns:a14="http://schemas.microsoft.com/office/drawing/2010/main" w="9525">
+                  <a14:hiddenLine xmlns:a14="http://schemas.microsoft.com/office/drawing/2010/main" xmlns="" w="9525">
                     <a:solidFill>
                       <a:srgbClr val="000000"/>
                     </a:solidFill>
@@ -10747,7 +10747,7 @@
               </a:ln>
               <a:extLst>
                 <a:ext uri="{91240B29-F687-4f45-9708-019B960494DF}">
-                  <a14:hiddenLine xmlns="" xmlns:a14="http://schemas.microsoft.com/office/drawing/2010/main" w="9525">
+                  <a14:hiddenLine xmlns:a14="http://schemas.microsoft.com/office/drawing/2010/main" xmlns="" w="9525">
                     <a:solidFill>
                       <a:srgbClr val="000000"/>
                     </a:solidFill>
@@ -10837,7 +10837,7 @@
               </a:ln>
               <a:extLst>
                 <a:ext uri="{91240B29-F687-4f45-9708-019B960494DF}">
-                  <a14:hiddenLine xmlns="" xmlns:a14="http://schemas.microsoft.com/office/drawing/2010/main" w="9525">
+                  <a14:hiddenLine xmlns:a14="http://schemas.microsoft.com/office/drawing/2010/main" xmlns="" w="9525">
                     <a:solidFill>
                       <a:srgbClr val="000000"/>
                     </a:solidFill>
@@ -10902,7 +10902,7 @@
               </a:ln>
               <a:extLst>
                 <a:ext uri="{91240B29-F687-4f45-9708-019B960494DF}">
-                  <a14:hiddenLine xmlns="" xmlns:a14="http://schemas.microsoft.com/office/drawing/2010/main" w="9525">
+                  <a14:hiddenLine xmlns:a14="http://schemas.microsoft.com/office/drawing/2010/main" xmlns="" w="9525">
                     <a:solidFill>
                       <a:srgbClr val="000000"/>
                     </a:solidFill>
@@ -11022,7 +11022,7 @@
               </a:ln>
               <a:extLst>
                 <a:ext uri="{91240B29-F687-4f45-9708-019B960494DF}">
-                  <a14:hiddenLine xmlns="" xmlns:a14="http://schemas.microsoft.com/office/drawing/2010/main" w="9525">
+                  <a14:hiddenLine xmlns:a14="http://schemas.microsoft.com/office/drawing/2010/main" xmlns="" w="9525">
                     <a:solidFill>
                       <a:srgbClr val="000000"/>
                     </a:solidFill>
@@ -11120,7 +11120,7 @@
               </a:ln>
               <a:extLst>
                 <a:ext uri="{91240B29-F687-4f45-9708-019B960494DF}">
-                  <a14:hiddenLine xmlns="" xmlns:a14="http://schemas.microsoft.com/office/drawing/2010/main" w="9525">
+                  <a14:hiddenLine xmlns:a14="http://schemas.microsoft.com/office/drawing/2010/main" xmlns="" w="9525">
                     <a:solidFill>
                       <a:srgbClr val="000000"/>
                     </a:solidFill>
@@ -11235,7 +11235,7 @@
               </a:ln>
               <a:extLst>
                 <a:ext uri="{91240B29-F687-4f45-9708-019B960494DF}">
-                  <a14:hiddenLine xmlns="" xmlns:a14="http://schemas.microsoft.com/office/drawing/2010/main" w="9525">
+                  <a14:hiddenLine xmlns:a14="http://schemas.microsoft.com/office/drawing/2010/main" xmlns="" w="9525">
                     <a:solidFill>
                       <a:srgbClr val="000000"/>
                     </a:solidFill>
@@ -11325,7 +11325,7 @@
               </a:ln>
               <a:extLst>
                 <a:ext uri="{91240B29-F687-4f45-9708-019B960494DF}">
-                  <a14:hiddenLine xmlns="" xmlns:a14="http://schemas.microsoft.com/office/drawing/2010/main" w="9525">
+                  <a14:hiddenLine xmlns:a14="http://schemas.microsoft.com/office/drawing/2010/main" xmlns="" w="9525">
                     <a:solidFill>
                       <a:srgbClr val="000000"/>
                     </a:solidFill>
@@ -11390,7 +11390,7 @@
               </a:ln>
               <a:extLst>
                 <a:ext uri="{91240B29-F687-4f45-9708-019B960494DF}">
-                  <a14:hiddenLine xmlns="" xmlns:a14="http://schemas.microsoft.com/office/drawing/2010/main" w="9525">
+                  <a14:hiddenLine xmlns:a14="http://schemas.microsoft.com/office/drawing/2010/main" xmlns="" w="9525">
                     <a:solidFill>
                       <a:srgbClr val="000000"/>
                     </a:solidFill>
@@ -11480,7 +11480,7 @@
               </a:ln>
               <a:extLst>
                 <a:ext uri="{91240B29-F687-4f45-9708-019B960494DF}">
-                  <a14:hiddenLine xmlns="" xmlns:a14="http://schemas.microsoft.com/office/drawing/2010/main" w="9525">
+                  <a14:hiddenLine xmlns:a14="http://schemas.microsoft.com/office/drawing/2010/main" xmlns="" w="9525">
                     <a:solidFill>
                       <a:srgbClr val="000000"/>
                     </a:solidFill>
@@ -11548,7 +11548,7 @@
               </a:ln>
               <a:extLst>
                 <a:ext uri="{91240B29-F687-4f45-9708-019B960494DF}">
-                  <a14:hiddenLine xmlns="" xmlns:a14="http://schemas.microsoft.com/office/drawing/2010/main" w="9525">
+                  <a14:hiddenLine xmlns:a14="http://schemas.microsoft.com/office/drawing/2010/main" xmlns="" w="9525">
                     <a:solidFill>
                       <a:srgbClr val="000000"/>
                     </a:solidFill>
@@ -11638,7 +11638,7 @@
               </a:ln>
               <a:extLst>
                 <a:ext uri="{91240B29-F687-4f45-9708-019B960494DF}">
-                  <a14:hiddenLine xmlns="" xmlns:a14="http://schemas.microsoft.com/office/drawing/2010/main" w="9525">
+                  <a14:hiddenLine xmlns:a14="http://schemas.microsoft.com/office/drawing/2010/main" xmlns="" w="9525">
                     <a:solidFill>
                       <a:srgbClr val="000000"/>
                     </a:solidFill>
@@ -11706,7 +11706,7 @@
               </a:ln>
               <a:extLst>
                 <a:ext uri="{91240B29-F687-4f45-9708-019B960494DF}">
-                  <a14:hiddenLine xmlns="" xmlns:a14="http://schemas.microsoft.com/office/drawing/2010/main" w="9525">
+                  <a14:hiddenLine xmlns:a14="http://schemas.microsoft.com/office/drawing/2010/main" xmlns="" w="9525">
                     <a:solidFill>
                       <a:srgbClr val="000000"/>
                     </a:solidFill>
@@ -11796,7 +11796,7 @@
               </a:ln>
               <a:extLst>
                 <a:ext uri="{91240B29-F687-4f45-9708-019B960494DF}">
-                  <a14:hiddenLine xmlns="" xmlns:a14="http://schemas.microsoft.com/office/drawing/2010/main" w="9525">
+                  <a14:hiddenLine xmlns:a14="http://schemas.microsoft.com/office/drawing/2010/main" xmlns="" w="9525">
                     <a:solidFill>
                       <a:srgbClr val="000000"/>
                     </a:solidFill>
@@ -11830,7 +11830,7 @@
               </a:ln>
               <a:extLst>
                 <a:ext uri="{91240B29-F687-4f45-9708-019B960494DF}">
-                  <a14:hiddenLine xmlns="" xmlns:a14="http://schemas.microsoft.com/office/drawing/2010/main" w="9525">
+                  <a14:hiddenLine xmlns:a14="http://schemas.microsoft.com/office/drawing/2010/main" xmlns="" w="9525">
                     <a:solidFill>
                       <a:srgbClr val="000000"/>
                     </a:solidFill>
@@ -12442,7 +12442,7 @@
     </p:spTree>
     <p:extLst>
       <p:ext uri="{BB962C8B-B14F-4D97-AF65-F5344CB8AC3E}">
-        <p14:creationId xmlns:p14="http://schemas.microsoft.com/office/powerpoint/2010/main" xmlns="" val="4209821317"/>
+        <p14:creationId xmlns="" xmlns:p14="http://schemas.microsoft.com/office/powerpoint/2010/main" val="4209821317"/>
       </p:ext>
     </p:extLst>
   </p:cSld>
@@ -12624,7 +12624,7 @@
     </p:spTree>
     <p:extLst>
       <p:ext uri="{BB962C8B-B14F-4D97-AF65-F5344CB8AC3E}">
-        <p14:creationId xmlns:p14="http://schemas.microsoft.com/office/powerpoint/2010/main" xmlns="" val="3205406010"/>
+        <p14:creationId xmlns="" xmlns:p14="http://schemas.microsoft.com/office/powerpoint/2010/main" val="3205406010"/>
       </p:ext>
     </p:extLst>
   </p:cSld>
@@ -12668,11 +12668,7 @@
           <a:p>
             <a:r>
               <a:rPr lang="en-US" dirty="0" smtClean="0"/>
-              <a:t>General </a:t>
-            </a:r>
-            <a:r>
-              <a:rPr lang="en-US" dirty="0" smtClean="0"/>
-              <a:t>Overview</a:t>
+              <a:t>General Overview</a:t>
             </a:r>
             <a:endParaRPr lang="en-US" dirty="0"/>
           </a:p>
@@ -12699,29 +12695,66 @@
             </a:r>
           </a:p>
           <a:p>
-            <a:pPr lvl="1"/>
+            <a:pPr marL="685800" lvl="2">
+              <a:spcBef>
+                <a:spcPts val="1000"/>
+              </a:spcBef>
+            </a:pPr>
             <a:r>
               <a:rPr lang="en-US" dirty="0" smtClean="0"/>
-              <a:t>The launcher will be a separate screen that is the graphical user interface between the user and accessing the server.</a:t>
-            </a:r>
-          </a:p>
-          <a:p>
-            <a:pPr lvl="1"/>
+              <a:t>The launcher will be a separate screen that is the graphical user interface between the user and accessing the server</a:t>
+            </a:r>
             <a:r>
               <a:rPr lang="en-US" dirty="0" smtClean="0"/>
-              <a:t>(I need Montana to help me add to the specification, design, and </a:t>
-            </a:r>
-            <a:r>
-              <a:rPr lang="en-US" dirty="0" err="1" smtClean="0"/>
-              <a:t>powerpoint</a:t>
-            </a:r>
+              <a:t>.</a:t>
+            </a:r>
+            <a:endParaRPr lang="en-US" dirty="0" smtClean="0"/>
+          </a:p>
+          <a:p>
+            <a:pPr marL="228600" lvl="1">
+              <a:spcBef>
+                <a:spcPts val="1000"/>
+              </a:spcBef>
+            </a:pPr>
+            <a:endParaRPr lang="en-US" dirty="0" smtClean="0"/>
+          </a:p>
+          <a:p>
+            <a:pPr marL="228600" lvl="1">
+              <a:spcBef>
+                <a:spcPts val="1000"/>
+              </a:spcBef>
+            </a:pPr>
+            <a:endParaRPr lang="en-US" dirty="0" smtClean="0"/>
+          </a:p>
+          <a:p>
+            <a:pPr marL="228600" lvl="1">
+              <a:spcBef>
+                <a:spcPts val="1000"/>
+              </a:spcBef>
+            </a:pPr>
+            <a:endParaRPr lang="en-US" dirty="0" smtClean="0"/>
+          </a:p>
+          <a:p>
+            <a:pPr marL="228600" lvl="1">
+              <a:spcBef>
+                <a:spcPts val="1000"/>
+              </a:spcBef>
+            </a:pPr>
             <a:r>
               <a:rPr lang="en-US" dirty="0" smtClean="0"/>
-              <a:t> with details about the launcher)</a:t>
-            </a:r>
-          </a:p>
-          <a:p>
-            <a:pPr lvl="1"/>
+              <a:t>The Game</a:t>
+            </a:r>
+          </a:p>
+          <a:p>
+            <a:pPr marL="685800" lvl="2">
+              <a:spcBef>
+                <a:spcPts val="1000"/>
+              </a:spcBef>
+            </a:pPr>
+            <a:r>
+              <a:rPr lang="en-US" dirty="0" smtClean="0"/>
+              <a:t>Gate of Gabethulu: A top-down 2D adventure looter that traverses a chaotically good world with a unsympathetically evil hero.</a:t>
+            </a:r>
             <a:endParaRPr lang="en-US" dirty="0" smtClean="0"/>
           </a:p>
         </p:txBody>
@@ -12729,7 +12762,7 @@
     </p:spTree>
     <p:extLst>
       <p:ext uri="{BB962C8B-B14F-4D97-AF65-F5344CB8AC3E}">
-        <p14:creationId xmlns:p14="http://schemas.microsoft.com/office/powerpoint/2010/main" xmlns="" val="459454196"/>
+        <p14:creationId xmlns="" xmlns:p14="http://schemas.microsoft.com/office/powerpoint/2010/main" val="459454196"/>
       </p:ext>
     </p:extLst>
   </p:cSld>
@@ -12771,10 +12804,6 @@
           <a:bodyPr/>
           <a:lstStyle/>
           <a:p>
-            <a:r>
-              <a:rPr lang="en-US" dirty="0" smtClean="0"/>
-              <a:t>**General Overview</a:t>
-            </a:r>
             <a:endParaRPr lang="en-US" dirty="0"/>
           </a:p>
         </p:txBody>
@@ -12794,26 +12823,6 @@
           <a:bodyPr numCol="2"/>
           <a:lstStyle/>
           <a:p>
-            <a:r>
-              <a:rPr lang="en-US" dirty="0" smtClean="0"/>
-              <a:t>Game</a:t>
-            </a:r>
-          </a:p>
-          <a:p>
-            <a:pPr lvl="1"/>
-            <a:r>
-              <a:rPr lang="en-US" dirty="0" smtClean="0"/>
-              <a:t>Plot:</a:t>
-            </a:r>
-          </a:p>
-          <a:p>
-            <a:pPr lvl="2"/>
-            <a:r>
-              <a:rPr lang="en-US" dirty="0" smtClean="0"/>
-              <a:t>Portal (The gate of our game) is opened by a chaotically good professor…. Continue later.</a:t>
-            </a:r>
-          </a:p>
-          <a:p>
             <a:pPr marL="914400" lvl="2" indent="0">
               <a:buNone/>
             </a:pPr>
@@ -12828,7 +12837,7 @@
     </p:spTree>
     <p:extLst>
       <p:ext uri="{BB962C8B-B14F-4D97-AF65-F5344CB8AC3E}">
-        <p14:creationId xmlns:p14="http://schemas.microsoft.com/office/powerpoint/2010/main" xmlns="" val="1934116844"/>
+        <p14:creationId xmlns="" xmlns:p14="http://schemas.microsoft.com/office/powerpoint/2010/main" val="1934116844"/>
       </p:ext>
     </p:extLst>
   </p:cSld>
@@ -12872,7 +12881,7 @@
           <a:p>
             <a:r>
               <a:rPr lang="en-US" dirty="0" smtClean="0"/>
-              <a:t>**Specification</a:t>
+              <a:t>Specification</a:t>
             </a:r>
             <a:endParaRPr lang="en-US" dirty="0"/>
           </a:p>
@@ -12904,7 +12913,11 @@
             <a:pPr lvl="1"/>
             <a:r>
               <a:rPr lang="en-US" dirty="0" smtClean="0"/>
-              <a:t>*Inventory management - 5 slot inventory system displayed vertically along the right border and it will be displayed on the right side of the screen. The user will be able to cycle through it. There will be a GUI overlay and there will be the ability to switch using 1 -5 for the different weapons.</a:t>
+              <a:t>Inventory </a:t>
+            </a:r>
+            <a:r>
+              <a:rPr lang="en-US" dirty="0" smtClean="0"/>
+              <a:t>management - 5 slot inventory system displayed vertically along the right border and it will be displayed on the right side of the screen. The user will be able to cycle through it. There will be a GUI overlay and there will be the ability to switch using 1 -5 for the different weapons.</a:t>
             </a:r>
           </a:p>
           <a:p>
@@ -12936,7 +12949,7 @@
     </p:spTree>
     <p:extLst>
       <p:ext uri="{BB962C8B-B14F-4D97-AF65-F5344CB8AC3E}">
-        <p14:creationId xmlns:p14="http://schemas.microsoft.com/office/powerpoint/2010/main" xmlns="" val="3092251181"/>
+        <p14:creationId xmlns="" xmlns:p14="http://schemas.microsoft.com/office/powerpoint/2010/main" val="3092251181"/>
       </p:ext>
     </p:extLst>
   </p:cSld>
@@ -12980,7 +12993,11 @@
           <a:p>
             <a:r>
               <a:rPr lang="en-US" dirty="0" smtClean="0"/>
-              <a:t>*Software design chosen</a:t>
+              <a:t>Software </a:t>
+            </a:r>
+            <a:r>
+              <a:rPr lang="en-US" dirty="0" smtClean="0"/>
+              <a:t>design chosen</a:t>
             </a:r>
             <a:endParaRPr lang="en-US" dirty="0"/>
           </a:p>
@@ -13081,7 +13098,7 @@
     </p:spTree>
     <p:extLst>
       <p:ext uri="{BB962C8B-B14F-4D97-AF65-F5344CB8AC3E}">
-        <p14:creationId xmlns:p14="http://schemas.microsoft.com/office/powerpoint/2010/main" xmlns="" val="1067613684"/>
+        <p14:creationId xmlns="" xmlns:p14="http://schemas.microsoft.com/office/powerpoint/2010/main" val="1067613684"/>
       </p:ext>
     </p:extLst>
   </p:cSld>
@@ -13227,7 +13244,7 @@
     </p:spTree>
     <p:extLst>
       <p:ext uri="{BB962C8B-B14F-4D97-AF65-F5344CB8AC3E}">
-        <p14:creationId xmlns:p14="http://schemas.microsoft.com/office/powerpoint/2010/main" xmlns="" val="3028125000"/>
+        <p14:creationId xmlns="" xmlns:p14="http://schemas.microsoft.com/office/powerpoint/2010/main" val="3028125000"/>
       </p:ext>
     </p:extLst>
   </p:cSld>
@@ -13387,7 +13404,7 @@
     </p:spTree>
     <p:extLst>
       <p:ext uri="{BB962C8B-B14F-4D97-AF65-F5344CB8AC3E}">
-        <p14:creationId xmlns:p14="http://schemas.microsoft.com/office/powerpoint/2010/main" xmlns="" val="3028125000"/>
+        <p14:creationId xmlns="" xmlns:p14="http://schemas.microsoft.com/office/powerpoint/2010/main" val="3028125000"/>
       </p:ext>
     </p:extLst>
   </p:cSld>
@@ -13583,7 +13600,7 @@
     </p:spTree>
     <p:extLst>
       <p:ext uri="{BB962C8B-B14F-4D97-AF65-F5344CB8AC3E}">
-        <p14:creationId xmlns:p14="http://schemas.microsoft.com/office/powerpoint/2010/main" xmlns="" val="3999698565"/>
+        <p14:creationId xmlns="" xmlns:p14="http://schemas.microsoft.com/office/powerpoint/2010/main" val="3999698565"/>
       </p:ext>
     </p:extLst>
   </p:cSld>
@@ -13845,7 +13862,7 @@
   <a:extraClrSchemeLst/>
   <a:extLst>
     <a:ext uri="{05A4C25C-085E-4340-85A3-A5531E510DB2}">
-      <thm15:themeFamily xmlns:thm15="http://schemas.microsoft.com/office/thememl/2012/main" xmlns="" name="Circuit" id="{0AC2F7E7-15F5-431C-B2A2-456FE929F56C}" vid="{0911B802-464C-4241-8DD9-B60FF88E379F}"/>
+      <thm15:themeFamily xmlns="" xmlns:thm15="http://schemas.microsoft.com/office/thememl/2012/main" name="Circuit" id="{0AC2F7E7-15F5-431C-B2A2-456FE929F56C}" vid="{0911B802-464C-4241-8DD9-B60FF88E379F}"/>
     </a:ext>
   </a:extLst>
 </a:theme>

</xml_diff>

<commit_message>
More editing to the powerpoint-- Teshing phase
</commit_message>
<xml_diff>
--- a/Gate of GAbethulu.pptx
+++ b/Gate of GAbethulu.pptx
@@ -4394,7 +4394,7 @@
             <a:fld id="{48A87A34-81AB-432B-8DAE-1953F412C126}" type="datetimeFigureOut">
               <a:rPr lang="en-US" dirty="0"/>
               <a:pPr/>
-              <a:t>4/26/2014</a:t>
+              <a:t>4/27/2014</a:t>
             </a:fld>
             <a:endParaRPr lang="en-US" dirty="0"/>
           </a:p>
@@ -4658,7 +4658,7 @@
             <a:fld id="{48A87A34-81AB-432B-8DAE-1953F412C126}" type="datetimeFigureOut">
               <a:rPr lang="en-US" dirty="0"/>
               <a:pPr/>
-              <a:t>4/26/2014</a:t>
+              <a:t>4/27/2014</a:t>
             </a:fld>
             <a:endParaRPr lang="en-US" dirty="0"/>
           </a:p>
@@ -4851,7 +4851,7 @@
             <a:fld id="{48A87A34-81AB-432B-8DAE-1953F412C126}" type="datetimeFigureOut">
               <a:rPr lang="en-US" dirty="0"/>
               <a:pPr/>
-              <a:t>4/26/2014</a:t>
+              <a:t>4/27/2014</a:t>
             </a:fld>
             <a:endParaRPr lang="en-US" dirty="0"/>
           </a:p>
@@ -5111,7 +5111,7 @@
             <a:fld id="{48A87A34-81AB-432B-8DAE-1953F412C126}" type="datetimeFigureOut">
               <a:rPr lang="en-US" dirty="0"/>
               <a:pPr/>
-              <a:t>4/26/2014</a:t>
+              <a:t>4/27/2014</a:t>
             </a:fld>
             <a:endParaRPr lang="en-US" dirty="0"/>
           </a:p>
@@ -5542,7 +5542,7 @@
             <a:fld id="{48A87A34-81AB-432B-8DAE-1953F412C126}" type="datetimeFigureOut">
               <a:rPr lang="en-US" dirty="0"/>
               <a:pPr/>
-              <a:t>4/26/2014</a:t>
+              <a:t>4/27/2014</a:t>
             </a:fld>
             <a:endParaRPr lang="en-US" dirty="0"/>
           </a:p>
@@ -6085,7 +6085,7 @@
             <a:fld id="{48A87A34-81AB-432B-8DAE-1953F412C126}" type="datetimeFigureOut">
               <a:rPr lang="en-US" dirty="0"/>
               <a:pPr/>
-              <a:t>4/26/2014</a:t>
+              <a:t>4/27/2014</a:t>
             </a:fld>
             <a:endParaRPr lang="en-US" dirty="0"/>
           </a:p>
@@ -6802,7 +6802,7 @@
             <a:fld id="{48A87A34-81AB-432B-8DAE-1953F412C126}" type="datetimeFigureOut">
               <a:rPr lang="en-US" dirty="0"/>
               <a:pPr/>
-              <a:t>4/26/2014</a:t>
+              <a:t>4/27/2014</a:t>
             </a:fld>
             <a:endParaRPr lang="en-US" dirty="0"/>
           </a:p>
@@ -6969,7 +6969,7 @@
             <a:fld id="{48A87A34-81AB-432B-8DAE-1953F412C126}" type="datetimeFigureOut">
               <a:rPr lang="en-US" dirty="0"/>
               <a:pPr/>
-              <a:t>4/26/2014</a:t>
+              <a:t>4/27/2014</a:t>
             </a:fld>
             <a:endParaRPr lang="en-US" dirty="0"/>
           </a:p>
@@ -7146,7 +7146,7 @@
             <a:fld id="{48A87A34-81AB-432B-8DAE-1953F412C126}" type="datetimeFigureOut">
               <a:rPr lang="en-US" dirty="0"/>
               <a:pPr/>
-              <a:t>4/26/2014</a:t>
+              <a:t>4/27/2014</a:t>
             </a:fld>
             <a:endParaRPr lang="en-US" dirty="0"/>
           </a:p>
@@ -7313,7 +7313,7 @@
             <a:fld id="{48A87A34-81AB-432B-8DAE-1953F412C126}" type="datetimeFigureOut">
               <a:rPr lang="en-US" dirty="0"/>
               <a:pPr/>
-              <a:t>4/26/2014</a:t>
+              <a:t>4/27/2014</a:t>
             </a:fld>
             <a:endParaRPr lang="en-US" dirty="0"/>
           </a:p>
@@ -7560,7 +7560,7 @@
             <a:fld id="{48A87A34-81AB-432B-8DAE-1953F412C126}" type="datetimeFigureOut">
               <a:rPr lang="en-US" dirty="0"/>
               <a:pPr/>
-              <a:t>4/26/2014</a:t>
+              <a:t>4/27/2014</a:t>
             </a:fld>
             <a:endParaRPr lang="en-US" dirty="0"/>
           </a:p>
@@ -7789,7 +7789,7 @@
             <a:fld id="{48A87A34-81AB-432B-8DAE-1953F412C126}" type="datetimeFigureOut">
               <a:rPr lang="en-US" dirty="0"/>
               <a:pPr/>
-              <a:t>4/26/2014</a:t>
+              <a:t>4/27/2014</a:t>
             </a:fld>
             <a:endParaRPr lang="en-US" dirty="0"/>
           </a:p>
@@ -8167,7 +8167,7 @@
             <a:fld id="{48A87A34-81AB-432B-8DAE-1953F412C126}" type="datetimeFigureOut">
               <a:rPr lang="en-US" dirty="0"/>
               <a:pPr/>
-              <a:t>4/26/2014</a:t>
+              <a:t>4/27/2014</a:t>
             </a:fld>
             <a:endParaRPr lang="en-US" dirty="0"/>
           </a:p>
@@ -8282,7 +8282,7 @@
             <a:fld id="{48A87A34-81AB-432B-8DAE-1953F412C126}" type="datetimeFigureOut">
               <a:rPr lang="en-US" dirty="0"/>
               <a:pPr/>
-              <a:t>4/26/2014</a:t>
+              <a:t>4/27/2014</a:t>
             </a:fld>
             <a:endParaRPr lang="en-US" dirty="0"/>
           </a:p>
@@ -8374,7 +8374,7 @@
             <a:fld id="{48A87A34-81AB-432B-8DAE-1953F412C126}" type="datetimeFigureOut">
               <a:rPr lang="en-US" dirty="0"/>
               <a:pPr/>
-              <a:t>4/26/2014</a:t>
+              <a:t>4/27/2014</a:t>
             </a:fld>
             <a:endParaRPr lang="en-US" dirty="0"/>
           </a:p>
@@ -8620,7 +8620,7 @@
             <a:fld id="{48A87A34-81AB-432B-8DAE-1953F412C126}" type="datetimeFigureOut">
               <a:rPr lang="en-US" dirty="0"/>
               <a:pPr/>
-              <a:t>4/26/2014</a:t>
+              <a:t>4/27/2014</a:t>
             </a:fld>
             <a:endParaRPr lang="en-US" dirty="0"/>
           </a:p>
@@ -8897,7 +8897,7 @@
             <a:fld id="{48A87A34-81AB-432B-8DAE-1953F412C126}" type="datetimeFigureOut">
               <a:rPr lang="en-US" dirty="0"/>
               <a:pPr/>
-              <a:t>4/26/2014</a:t>
+              <a:t>4/27/2014</a:t>
             </a:fld>
             <a:endParaRPr lang="en-US" dirty="0"/>
           </a:p>
@@ -11971,7 +11971,7 @@
             <a:fld id="{48A87A34-81AB-432B-8DAE-1953F412C126}" type="datetimeFigureOut">
               <a:rPr lang="en-US" dirty="0"/>
               <a:pPr/>
-              <a:t>4/26/2014</a:t>
+              <a:t>4/27/2014</a:t>
             </a:fld>
             <a:endParaRPr lang="en-US" dirty="0"/>
           </a:p>
@@ -12505,7 +12505,7 @@
         <p:spPr/>
         <p:txBody>
           <a:bodyPr>
-            <a:normAutofit lnSpcReduction="10000"/>
+            <a:normAutofit fontScale="92500" lnSpcReduction="20000"/>
           </a:bodyPr>
           <a:lstStyle/>
           <a:p>
@@ -12535,7 +12535,25 @@
           <a:p>
             <a:r>
               <a:rPr lang="en-US" dirty="0" smtClean="0"/>
-              <a:t>Play game and produce no change in output and push to the launcher.</a:t>
+              <a:t>Play game and produce no change in output and push to the launcher</a:t>
+            </a:r>
+            <a:r>
+              <a:rPr lang="en-US" dirty="0" smtClean="0"/>
+              <a:t>.</a:t>
+            </a:r>
+          </a:p>
+          <a:p>
+            <a:r>
+              <a:rPr lang="en-US" dirty="0" smtClean="0"/>
+              <a:t>Test all walls and barriers in the game, all methods to cause death and </a:t>
+            </a:r>
+            <a:r>
+              <a:rPr lang="en-US" smtClean="0"/>
+              <a:t>subsequent re-spawns</a:t>
+            </a:r>
+            <a:r>
+              <a:rPr lang="en-US" dirty="0" smtClean="0"/>
+              <a:t>.</a:t>
             </a:r>
             <a:endParaRPr lang="en-US" dirty="0"/>
           </a:p>
@@ -12702,13 +12720,8 @@
             </a:pPr>
             <a:r>
               <a:rPr lang="en-US" dirty="0" smtClean="0"/>
-              <a:t>The launcher will be a separate screen that is the graphical user interface between the user and accessing the server</a:t>
-            </a:r>
-            <a:r>
-              <a:rPr lang="en-US" dirty="0" smtClean="0"/>
-              <a:t>.</a:t>
-            </a:r>
-            <a:endParaRPr lang="en-US" dirty="0" smtClean="0"/>
+              <a:t>The launcher will be a separate screen that is the graphical user interface between the user and accessing the server.</a:t>
+            </a:r>
           </a:p>
           <a:p>
             <a:pPr marL="228600" lvl="1">
@@ -12755,7 +12768,6 @@
               <a:rPr lang="en-US" dirty="0" smtClean="0"/>
               <a:t>Gate of Gabethulu: A top-down 2D adventure looter that traverses a chaotically good world with a unsympathetically evil hero.</a:t>
             </a:r>
-            <a:endParaRPr lang="en-US" dirty="0" smtClean="0"/>
           </a:p>
         </p:txBody>
       </p:sp>
@@ -12804,6 +12816,10 @@
           <a:bodyPr/>
           <a:lstStyle/>
           <a:p>
+            <a:r>
+              <a:rPr lang="en-US" dirty="0" smtClean="0"/>
+              <a:t>A Short Prezi on our project</a:t>
+            </a:r>
             <a:endParaRPr lang="en-US" dirty="0"/>
           </a:p>
         </p:txBody>
@@ -12913,11 +12929,7 @@
             <a:pPr lvl="1"/>
             <a:r>
               <a:rPr lang="en-US" dirty="0" smtClean="0"/>
-              <a:t>Inventory </a:t>
-            </a:r>
-            <a:r>
-              <a:rPr lang="en-US" dirty="0" smtClean="0"/>
-              <a:t>management - 5 slot inventory system displayed vertically along the right border and it will be displayed on the right side of the screen. The user will be able to cycle through it. There will be a GUI overlay and there will be the ability to switch using 1 -5 for the different weapons.</a:t>
+              <a:t>Inventory management - 5 slot inventory system displayed vertically along the right border and it will be displayed on the right side of the screen. The user will be able to cycle through it. There will be a GUI overlay and there will be the ability to switch using 1 -5 for the different weapons.</a:t>
             </a:r>
           </a:p>
           <a:p>
@@ -12993,11 +13005,7 @@
           <a:p>
             <a:r>
               <a:rPr lang="en-US" dirty="0" smtClean="0"/>
-              <a:t>Software </a:t>
-            </a:r>
-            <a:r>
-              <a:rPr lang="en-US" dirty="0" smtClean="0"/>
-              <a:t>design chosen</a:t>
+              <a:t>Software design chosen</a:t>
             </a:r>
             <a:endParaRPr lang="en-US" dirty="0"/>
           </a:p>

</xml_diff>

<commit_message>
Oh dear Lord this is taking forever.
</commit_message>
<xml_diff>
--- a/Gate of GAbethulu.pptx
+++ b/Gate of GAbethulu.pptx
@@ -147,7 +147,7 @@
             <a:alphaModFix amt="30000"/>
             <a:extLst>
               <a:ext uri="{28A0092B-C50C-407E-A947-70E740481C1C}">
-                <a14:useLocalDpi xmlns="" xmlns:a14="http://schemas.microsoft.com/office/drawing/2010/main" val="0"/>
+                <a14:useLocalDpi xmlns:a14="http://schemas.microsoft.com/office/drawing/2010/main" xmlns="" val="0"/>
               </a:ext>
             </a:extLst>
           </a:blip>
@@ -167,7 +167,7 @@
           <a:noFill/>
           <a:extLst>
             <a:ext uri="{909E8E84-426E-40dd-AFC4-6F175D3DCCD1}">
-              <a14:hiddenFill xmlns:a14="http://schemas.microsoft.com/office/drawing/2010/main" xmlns="">
+              <a14:hiddenFill xmlns="" xmlns:a14="http://schemas.microsoft.com/office/drawing/2010/main">
                 <a:solidFill>
                   <a:srgbClr val="FFFFFF"/>
                 </a:solidFill>
@@ -227,7 +227,7 @@
             </a:ln>
             <a:extLst>
               <a:ext uri="{91240B29-F687-4f45-9708-019B960494DF}">
-                <a14:hiddenLine xmlns:a14="http://schemas.microsoft.com/office/drawing/2010/main" xmlns="" w="9525">
+                <a14:hiddenLine xmlns="" xmlns:a14="http://schemas.microsoft.com/office/drawing/2010/main" w="9525">
                   <a:solidFill>
                     <a:srgbClr val="000000"/>
                   </a:solidFill>
@@ -317,7 +317,7 @@
             </a:ln>
             <a:extLst>
               <a:ext uri="{91240B29-F687-4f45-9708-019B960494DF}">
-                <a14:hiddenLine xmlns:a14="http://schemas.microsoft.com/office/drawing/2010/main" xmlns="" w="9525">
+                <a14:hiddenLine xmlns="" xmlns:a14="http://schemas.microsoft.com/office/drawing/2010/main" w="9525">
                   <a:solidFill>
                     <a:srgbClr val="000000"/>
                   </a:solidFill>
@@ -407,7 +407,7 @@
             </a:ln>
             <a:extLst>
               <a:ext uri="{91240B29-F687-4f45-9708-019B960494DF}">
-                <a14:hiddenLine xmlns:a14="http://schemas.microsoft.com/office/drawing/2010/main" xmlns="" w="9525">
+                <a14:hiddenLine xmlns="" xmlns:a14="http://schemas.microsoft.com/office/drawing/2010/main" w="9525">
                   <a:solidFill>
                     <a:srgbClr val="000000"/>
                   </a:solidFill>
@@ -441,7 +441,7 @@
             </a:ln>
             <a:extLst>
               <a:ext uri="{91240B29-F687-4f45-9708-019B960494DF}">
-                <a14:hiddenLine xmlns:a14="http://schemas.microsoft.com/office/drawing/2010/main" xmlns="" w="9525">
+                <a14:hiddenLine xmlns="" xmlns:a14="http://schemas.microsoft.com/office/drawing/2010/main" w="9525">
                   <a:solidFill>
                     <a:srgbClr val="000000"/>
                   </a:solidFill>
@@ -531,7 +531,7 @@
             </a:ln>
             <a:extLst>
               <a:ext uri="{91240B29-F687-4f45-9708-019B960494DF}">
-                <a14:hiddenLine xmlns:a14="http://schemas.microsoft.com/office/drawing/2010/main" xmlns="" w="9525">
+                <a14:hiddenLine xmlns="" xmlns:a14="http://schemas.microsoft.com/office/drawing/2010/main" w="9525">
                   <a:solidFill>
                     <a:srgbClr val="000000"/>
                   </a:solidFill>
@@ -593,7 +593,7 @@
             </a:ln>
             <a:extLst>
               <a:ext uri="{91240B29-F687-4f45-9708-019B960494DF}">
-                <a14:hiddenLine xmlns:a14="http://schemas.microsoft.com/office/drawing/2010/main" xmlns="" w="9525">
+                <a14:hiddenLine xmlns="" xmlns:a14="http://schemas.microsoft.com/office/drawing/2010/main" w="9525">
                   <a:solidFill>
                     <a:srgbClr val="000000"/>
                   </a:solidFill>
@@ -655,7 +655,7 @@
             </a:ln>
             <a:extLst>
               <a:ext uri="{91240B29-F687-4f45-9708-019B960494DF}">
-                <a14:hiddenLine xmlns:a14="http://schemas.microsoft.com/office/drawing/2010/main" xmlns="" w="9525">
+                <a14:hiddenLine xmlns="" xmlns:a14="http://schemas.microsoft.com/office/drawing/2010/main" w="9525">
                   <a:solidFill>
                     <a:srgbClr val="000000"/>
                   </a:solidFill>
@@ -745,7 +745,7 @@
             </a:ln>
             <a:extLst>
               <a:ext uri="{91240B29-F687-4f45-9708-019B960494DF}">
-                <a14:hiddenLine xmlns:a14="http://schemas.microsoft.com/office/drawing/2010/main" xmlns="" w="9525">
+                <a14:hiddenLine xmlns="" xmlns:a14="http://schemas.microsoft.com/office/drawing/2010/main" w="9525">
                   <a:solidFill>
                     <a:srgbClr val="000000"/>
                   </a:solidFill>
@@ -807,7 +807,7 @@
             </a:ln>
             <a:extLst>
               <a:ext uri="{91240B29-F687-4f45-9708-019B960494DF}">
-                <a14:hiddenLine xmlns:a14="http://schemas.microsoft.com/office/drawing/2010/main" xmlns="" w="9525">
+                <a14:hiddenLine xmlns="" xmlns:a14="http://schemas.microsoft.com/office/drawing/2010/main" w="9525">
                   <a:solidFill>
                     <a:srgbClr val="000000"/>
                   </a:solidFill>
@@ -869,7 +869,7 @@
             </a:ln>
             <a:extLst>
               <a:ext uri="{91240B29-F687-4f45-9708-019B960494DF}">
-                <a14:hiddenLine xmlns:a14="http://schemas.microsoft.com/office/drawing/2010/main" xmlns="" w="9525">
+                <a14:hiddenLine xmlns="" xmlns:a14="http://schemas.microsoft.com/office/drawing/2010/main" w="9525">
                   <a:solidFill>
                     <a:srgbClr val="000000"/>
                   </a:solidFill>
@@ -959,7 +959,7 @@
             </a:ln>
             <a:extLst>
               <a:ext uri="{91240B29-F687-4f45-9708-019B960494DF}">
-                <a14:hiddenLine xmlns:a14="http://schemas.microsoft.com/office/drawing/2010/main" xmlns="" w="9525">
+                <a14:hiddenLine xmlns="" xmlns:a14="http://schemas.microsoft.com/office/drawing/2010/main" w="9525">
                   <a:solidFill>
                     <a:srgbClr val="000000"/>
                   </a:solidFill>
@@ -1049,7 +1049,7 @@
             </a:ln>
             <a:extLst>
               <a:ext uri="{91240B29-F687-4f45-9708-019B960494DF}">
-                <a14:hiddenLine xmlns:a14="http://schemas.microsoft.com/office/drawing/2010/main" xmlns="" w="9525">
+                <a14:hiddenLine xmlns="" xmlns:a14="http://schemas.microsoft.com/office/drawing/2010/main" w="9525">
                   <a:solidFill>
                     <a:srgbClr val="000000"/>
                   </a:solidFill>
@@ -1111,7 +1111,7 @@
             </a:ln>
             <a:extLst>
               <a:ext uri="{91240B29-F687-4f45-9708-019B960494DF}">
-                <a14:hiddenLine xmlns:a14="http://schemas.microsoft.com/office/drawing/2010/main" xmlns="" w="9525">
+                <a14:hiddenLine xmlns="" xmlns:a14="http://schemas.microsoft.com/office/drawing/2010/main" w="9525">
                   <a:solidFill>
                     <a:srgbClr val="000000"/>
                   </a:solidFill>
@@ -1221,7 +1221,7 @@
             </a:ln>
             <a:extLst>
               <a:ext uri="{91240B29-F687-4f45-9708-019B960494DF}">
-                <a14:hiddenLine xmlns:a14="http://schemas.microsoft.com/office/drawing/2010/main" xmlns="" w="9525">
+                <a14:hiddenLine xmlns="" xmlns:a14="http://schemas.microsoft.com/office/drawing/2010/main" w="9525">
                   <a:solidFill>
                     <a:srgbClr val="000000"/>
                   </a:solidFill>
@@ -1283,7 +1283,7 @@
             </a:ln>
             <a:extLst>
               <a:ext uri="{91240B29-F687-4f45-9708-019B960494DF}">
-                <a14:hiddenLine xmlns:a14="http://schemas.microsoft.com/office/drawing/2010/main" xmlns="" w="9525">
+                <a14:hiddenLine xmlns="" xmlns:a14="http://schemas.microsoft.com/office/drawing/2010/main" w="9525">
                   <a:solidFill>
                     <a:srgbClr val="000000"/>
                   </a:solidFill>
@@ -1373,7 +1373,7 @@
             </a:ln>
             <a:extLst>
               <a:ext uri="{91240B29-F687-4f45-9708-019B960494DF}">
-                <a14:hiddenLine xmlns:a14="http://schemas.microsoft.com/office/drawing/2010/main" xmlns="" w="9525">
+                <a14:hiddenLine xmlns="" xmlns:a14="http://schemas.microsoft.com/office/drawing/2010/main" w="9525">
                   <a:solidFill>
                     <a:srgbClr val="000000"/>
                   </a:solidFill>
@@ -1463,7 +1463,7 @@
             </a:ln>
             <a:extLst>
               <a:ext uri="{91240B29-F687-4f45-9708-019B960494DF}">
-                <a14:hiddenLine xmlns:a14="http://schemas.microsoft.com/office/drawing/2010/main" xmlns="" w="9525">
+                <a14:hiddenLine xmlns="" xmlns:a14="http://schemas.microsoft.com/office/drawing/2010/main" w="9525">
                   <a:solidFill>
                     <a:srgbClr val="000000"/>
                   </a:solidFill>
@@ -1525,7 +1525,7 @@
             </a:ln>
             <a:extLst>
               <a:ext uri="{91240B29-F687-4f45-9708-019B960494DF}">
-                <a14:hiddenLine xmlns:a14="http://schemas.microsoft.com/office/drawing/2010/main" xmlns="" w="9525">
+                <a14:hiddenLine xmlns="" xmlns:a14="http://schemas.microsoft.com/office/drawing/2010/main" w="9525">
                   <a:solidFill>
                     <a:srgbClr val="000000"/>
                   </a:solidFill>
@@ -1615,7 +1615,7 @@
             </a:ln>
             <a:extLst>
               <a:ext uri="{91240B29-F687-4f45-9708-019B960494DF}">
-                <a14:hiddenLine xmlns:a14="http://schemas.microsoft.com/office/drawing/2010/main" xmlns="" w="9525">
+                <a14:hiddenLine xmlns="" xmlns:a14="http://schemas.microsoft.com/office/drawing/2010/main" w="9525">
                   <a:solidFill>
                     <a:srgbClr val="000000"/>
                   </a:solidFill>
@@ -1705,7 +1705,7 @@
             </a:ln>
             <a:extLst>
               <a:ext uri="{91240B29-F687-4f45-9708-019B960494DF}">
-                <a14:hiddenLine xmlns:a14="http://schemas.microsoft.com/office/drawing/2010/main" xmlns="" w="9525">
+                <a14:hiddenLine xmlns="" xmlns:a14="http://schemas.microsoft.com/office/drawing/2010/main" w="9525">
                   <a:solidFill>
                     <a:srgbClr val="000000"/>
                   </a:solidFill>
@@ -1761,7 +1761,7 @@
             </a:ln>
             <a:extLst>
               <a:ext uri="{91240B29-F687-4f45-9708-019B960494DF}">
-                <a14:hiddenLine xmlns:a14="http://schemas.microsoft.com/office/drawing/2010/main" xmlns="" w="9525">
+                <a14:hiddenLine xmlns="" xmlns:a14="http://schemas.microsoft.com/office/drawing/2010/main" w="9525">
                   <a:solidFill>
                     <a:srgbClr val="000000"/>
                   </a:solidFill>
@@ -1851,7 +1851,7 @@
             </a:ln>
             <a:extLst>
               <a:ext uri="{91240B29-F687-4f45-9708-019B960494DF}">
-                <a14:hiddenLine xmlns:a14="http://schemas.microsoft.com/office/drawing/2010/main" xmlns="" w="9525">
+                <a14:hiddenLine xmlns="" xmlns:a14="http://schemas.microsoft.com/office/drawing/2010/main" w="9525">
                   <a:solidFill>
                     <a:srgbClr val="000000"/>
                   </a:solidFill>
@@ -1907,7 +1907,7 @@
             </a:ln>
             <a:extLst>
               <a:ext uri="{91240B29-F687-4f45-9708-019B960494DF}">
-                <a14:hiddenLine xmlns:a14="http://schemas.microsoft.com/office/drawing/2010/main" xmlns="" w="9525">
+                <a14:hiddenLine xmlns="" xmlns:a14="http://schemas.microsoft.com/office/drawing/2010/main" w="9525">
                   <a:solidFill>
                     <a:srgbClr val="000000"/>
                   </a:solidFill>
@@ -1997,7 +1997,7 @@
             </a:ln>
             <a:extLst>
               <a:ext uri="{91240B29-F687-4f45-9708-019B960494DF}">
-                <a14:hiddenLine xmlns:a14="http://schemas.microsoft.com/office/drawing/2010/main" xmlns="" w="9525">
+                <a14:hiddenLine xmlns="" xmlns:a14="http://schemas.microsoft.com/office/drawing/2010/main" w="9525">
                   <a:solidFill>
                     <a:srgbClr val="000000"/>
                   </a:solidFill>
@@ -2065,7 +2065,7 @@
             </a:ln>
             <a:extLst>
               <a:ext uri="{91240B29-F687-4f45-9708-019B960494DF}">
-                <a14:hiddenLine xmlns:a14="http://schemas.microsoft.com/office/drawing/2010/main" xmlns="" w="9525">
+                <a14:hiddenLine xmlns="" xmlns:a14="http://schemas.microsoft.com/office/drawing/2010/main" w="9525">
                   <a:solidFill>
                     <a:srgbClr val="000000"/>
                   </a:solidFill>
@@ -2155,7 +2155,7 @@
             </a:ln>
             <a:extLst>
               <a:ext uri="{91240B29-F687-4f45-9708-019B960494DF}">
-                <a14:hiddenLine xmlns:a14="http://schemas.microsoft.com/office/drawing/2010/main" xmlns="" w="9525">
+                <a14:hiddenLine xmlns="" xmlns:a14="http://schemas.microsoft.com/office/drawing/2010/main" w="9525">
                   <a:solidFill>
                     <a:srgbClr val="000000"/>
                   </a:solidFill>
@@ -2223,7 +2223,7 @@
             </a:ln>
             <a:extLst>
               <a:ext uri="{91240B29-F687-4f45-9708-019B960494DF}">
-                <a14:hiddenLine xmlns:a14="http://schemas.microsoft.com/office/drawing/2010/main" xmlns="" w="9525">
+                <a14:hiddenLine xmlns="" xmlns:a14="http://schemas.microsoft.com/office/drawing/2010/main" w="9525">
                   <a:solidFill>
                     <a:srgbClr val="000000"/>
                   </a:solidFill>
@@ -2313,7 +2313,7 @@
             </a:ln>
             <a:extLst>
               <a:ext uri="{91240B29-F687-4f45-9708-019B960494DF}">
-                <a14:hiddenLine xmlns:a14="http://schemas.microsoft.com/office/drawing/2010/main" xmlns="" w="9525">
+                <a14:hiddenLine xmlns="" xmlns:a14="http://schemas.microsoft.com/office/drawing/2010/main" w="9525">
                   <a:solidFill>
                     <a:srgbClr val="000000"/>
                   </a:solidFill>
@@ -2347,7 +2347,7 @@
             </a:ln>
             <a:extLst>
               <a:ext uri="{91240B29-F687-4f45-9708-019B960494DF}">
-                <a14:hiddenLine xmlns:a14="http://schemas.microsoft.com/office/drawing/2010/main" xmlns="" w="9525">
+                <a14:hiddenLine xmlns="" xmlns:a14="http://schemas.microsoft.com/office/drawing/2010/main" w="9525">
                   <a:solidFill>
                     <a:srgbClr val="000000"/>
                   </a:solidFill>
@@ -2437,7 +2437,7 @@
             </a:ln>
             <a:extLst>
               <a:ext uri="{91240B29-F687-4f45-9708-019B960494DF}">
-                <a14:hiddenLine xmlns:a14="http://schemas.microsoft.com/office/drawing/2010/main" xmlns="" w="9525">
+                <a14:hiddenLine xmlns="" xmlns:a14="http://schemas.microsoft.com/office/drawing/2010/main" w="9525">
                   <a:solidFill>
                     <a:srgbClr val="000000"/>
                   </a:solidFill>
@@ -2499,7 +2499,7 @@
             </a:ln>
             <a:extLst>
               <a:ext uri="{91240B29-F687-4f45-9708-019B960494DF}">
-                <a14:hiddenLine xmlns:a14="http://schemas.microsoft.com/office/drawing/2010/main" xmlns="" w="9525">
+                <a14:hiddenLine xmlns="" xmlns:a14="http://schemas.microsoft.com/office/drawing/2010/main" w="9525">
                   <a:solidFill>
                     <a:srgbClr val="000000"/>
                   </a:solidFill>
@@ -2561,7 +2561,7 @@
             </a:ln>
             <a:extLst>
               <a:ext uri="{91240B29-F687-4f45-9708-019B960494DF}">
-                <a14:hiddenLine xmlns:a14="http://schemas.microsoft.com/office/drawing/2010/main" xmlns="" w="9525">
+                <a14:hiddenLine xmlns="" xmlns:a14="http://schemas.microsoft.com/office/drawing/2010/main" w="9525">
                   <a:solidFill>
                     <a:srgbClr val="000000"/>
                   </a:solidFill>
@@ -2651,7 +2651,7 @@
             </a:ln>
             <a:extLst>
               <a:ext uri="{91240B29-F687-4f45-9708-019B960494DF}">
-                <a14:hiddenLine xmlns:a14="http://schemas.microsoft.com/office/drawing/2010/main" xmlns="" w="9525">
+                <a14:hiddenLine xmlns="" xmlns:a14="http://schemas.microsoft.com/office/drawing/2010/main" w="9525">
                   <a:solidFill>
                     <a:srgbClr val="000000"/>
                   </a:solidFill>
@@ -2719,7 +2719,7 @@
             </a:ln>
             <a:extLst>
               <a:ext uri="{91240B29-F687-4f45-9708-019B960494DF}">
-                <a14:hiddenLine xmlns:a14="http://schemas.microsoft.com/office/drawing/2010/main" xmlns="" w="9525">
+                <a14:hiddenLine xmlns="" xmlns:a14="http://schemas.microsoft.com/office/drawing/2010/main" w="9525">
                   <a:solidFill>
                     <a:srgbClr val="000000"/>
                   </a:solidFill>
@@ -2781,7 +2781,7 @@
             </a:ln>
             <a:extLst>
               <a:ext uri="{91240B29-F687-4f45-9708-019B960494DF}">
-                <a14:hiddenLine xmlns:a14="http://schemas.microsoft.com/office/drawing/2010/main" xmlns="" w="9525">
+                <a14:hiddenLine xmlns="" xmlns:a14="http://schemas.microsoft.com/office/drawing/2010/main" w="9525">
                   <a:solidFill>
                     <a:srgbClr val="000000"/>
                   </a:solidFill>
@@ -2871,7 +2871,7 @@
             </a:ln>
             <a:extLst>
               <a:ext uri="{91240B29-F687-4f45-9708-019B960494DF}">
-                <a14:hiddenLine xmlns:a14="http://schemas.microsoft.com/office/drawing/2010/main" xmlns="" w="9525">
+                <a14:hiddenLine xmlns="" xmlns:a14="http://schemas.microsoft.com/office/drawing/2010/main" w="9525">
                   <a:solidFill>
                     <a:srgbClr val="000000"/>
                   </a:solidFill>
@@ -2933,7 +2933,7 @@
             </a:ln>
             <a:extLst>
               <a:ext uri="{91240B29-F687-4f45-9708-019B960494DF}">
-                <a14:hiddenLine xmlns:a14="http://schemas.microsoft.com/office/drawing/2010/main" xmlns="" w="9525">
+                <a14:hiddenLine xmlns="" xmlns:a14="http://schemas.microsoft.com/office/drawing/2010/main" w="9525">
                   <a:solidFill>
                     <a:srgbClr val="000000"/>
                   </a:solidFill>
@@ -3023,7 +3023,7 @@
             </a:ln>
             <a:extLst>
               <a:ext uri="{91240B29-F687-4f45-9708-019B960494DF}">
-                <a14:hiddenLine xmlns:a14="http://schemas.microsoft.com/office/drawing/2010/main" xmlns="" w="9525">
+                <a14:hiddenLine xmlns="" xmlns:a14="http://schemas.microsoft.com/office/drawing/2010/main" w="9525">
                   <a:solidFill>
                     <a:srgbClr val="000000"/>
                   </a:solidFill>
@@ -3085,7 +3085,7 @@
             </a:ln>
             <a:extLst>
               <a:ext uri="{91240B29-F687-4f45-9708-019B960494DF}">
-                <a14:hiddenLine xmlns:a14="http://schemas.microsoft.com/office/drawing/2010/main" xmlns="" w="9525">
+                <a14:hiddenLine xmlns="" xmlns:a14="http://schemas.microsoft.com/office/drawing/2010/main" w="9525">
                   <a:solidFill>
                     <a:srgbClr val="000000"/>
                   </a:solidFill>
@@ -3175,7 +3175,7 @@
             </a:ln>
             <a:extLst>
               <a:ext uri="{91240B29-F687-4f45-9708-019B960494DF}">
-                <a14:hiddenLine xmlns:a14="http://schemas.microsoft.com/office/drawing/2010/main" xmlns="" w="9525">
+                <a14:hiddenLine xmlns="" xmlns:a14="http://schemas.microsoft.com/office/drawing/2010/main" w="9525">
                   <a:solidFill>
                     <a:srgbClr val="000000"/>
                   </a:solidFill>
@@ -3209,7 +3209,7 @@
             </a:ln>
             <a:extLst>
               <a:ext uri="{91240B29-F687-4f45-9708-019B960494DF}">
-                <a14:hiddenLine xmlns:a14="http://schemas.microsoft.com/office/drawing/2010/main" xmlns="" w="9525">
+                <a14:hiddenLine xmlns="" xmlns:a14="http://schemas.microsoft.com/office/drawing/2010/main" w="9525">
                   <a:solidFill>
                     <a:srgbClr val="000000"/>
                   </a:solidFill>
@@ -3274,7 +3274,7 @@
             </a:ln>
             <a:extLst>
               <a:ext uri="{91240B29-F687-4f45-9708-019B960494DF}">
-                <a14:hiddenLine xmlns:a14="http://schemas.microsoft.com/office/drawing/2010/main" xmlns="" w="9525">
+                <a14:hiddenLine xmlns="" xmlns:a14="http://schemas.microsoft.com/office/drawing/2010/main" w="9525">
                   <a:solidFill>
                     <a:srgbClr val="000000"/>
                   </a:solidFill>
@@ -3364,7 +3364,7 @@
             </a:ln>
             <a:extLst>
               <a:ext uri="{91240B29-F687-4f45-9708-019B960494DF}">
-                <a14:hiddenLine xmlns:a14="http://schemas.microsoft.com/office/drawing/2010/main" xmlns="" w="9525">
+                <a14:hiddenLine xmlns="" xmlns:a14="http://schemas.microsoft.com/office/drawing/2010/main" w="9525">
                   <a:solidFill>
                     <a:srgbClr val="000000"/>
                   </a:solidFill>
@@ -3426,7 +3426,7 @@
             </a:ln>
             <a:extLst>
               <a:ext uri="{91240B29-F687-4f45-9708-019B960494DF}">
-                <a14:hiddenLine xmlns:a14="http://schemas.microsoft.com/office/drawing/2010/main" xmlns="" w="9525">
+                <a14:hiddenLine xmlns="" xmlns:a14="http://schemas.microsoft.com/office/drawing/2010/main" w="9525">
                   <a:solidFill>
                     <a:srgbClr val="000000"/>
                   </a:solidFill>
@@ -3516,7 +3516,7 @@
             </a:ln>
             <a:extLst>
               <a:ext uri="{91240B29-F687-4f45-9708-019B960494DF}">
-                <a14:hiddenLine xmlns:a14="http://schemas.microsoft.com/office/drawing/2010/main" xmlns="" w="9525">
+                <a14:hiddenLine xmlns="" xmlns:a14="http://schemas.microsoft.com/office/drawing/2010/main" w="9525">
                   <a:solidFill>
                     <a:srgbClr val="000000"/>
                   </a:solidFill>
@@ -3606,7 +3606,7 @@
             </a:ln>
             <a:extLst>
               <a:ext uri="{91240B29-F687-4f45-9708-019B960494DF}">
-                <a14:hiddenLine xmlns:a14="http://schemas.microsoft.com/office/drawing/2010/main" xmlns="" w="9525">
+                <a14:hiddenLine xmlns="" xmlns:a14="http://schemas.microsoft.com/office/drawing/2010/main" w="9525">
                   <a:solidFill>
                     <a:srgbClr val="000000"/>
                   </a:solidFill>
@@ -3671,7 +3671,7 @@
             </a:ln>
             <a:extLst>
               <a:ext uri="{91240B29-F687-4f45-9708-019B960494DF}">
-                <a14:hiddenLine xmlns:a14="http://schemas.microsoft.com/office/drawing/2010/main" xmlns="" w="9525">
+                <a14:hiddenLine xmlns="" xmlns:a14="http://schemas.microsoft.com/office/drawing/2010/main" w="9525">
                   <a:solidFill>
                     <a:srgbClr val="000000"/>
                   </a:solidFill>
@@ -3733,7 +3733,7 @@
             </a:ln>
             <a:extLst>
               <a:ext uri="{91240B29-F687-4f45-9708-019B960494DF}">
-                <a14:hiddenLine xmlns:a14="http://schemas.microsoft.com/office/drawing/2010/main" xmlns="" w="9525">
+                <a14:hiddenLine xmlns="" xmlns:a14="http://schemas.microsoft.com/office/drawing/2010/main" w="9525">
                   <a:solidFill>
                     <a:srgbClr val="000000"/>
                   </a:solidFill>
@@ -3823,7 +3823,7 @@
             </a:ln>
             <a:extLst>
               <a:ext uri="{91240B29-F687-4f45-9708-019B960494DF}">
-                <a14:hiddenLine xmlns:a14="http://schemas.microsoft.com/office/drawing/2010/main" xmlns="" w="9525">
+                <a14:hiddenLine xmlns="" xmlns:a14="http://schemas.microsoft.com/office/drawing/2010/main" w="9525">
                   <a:solidFill>
                     <a:srgbClr val="000000"/>
                   </a:solidFill>
@@ -3913,7 +3913,7 @@
             </a:ln>
             <a:extLst>
               <a:ext uri="{91240B29-F687-4f45-9708-019B960494DF}">
-                <a14:hiddenLine xmlns:a14="http://schemas.microsoft.com/office/drawing/2010/main" xmlns="" w="9525">
+                <a14:hiddenLine xmlns="" xmlns:a14="http://schemas.microsoft.com/office/drawing/2010/main" w="9525">
                   <a:solidFill>
                     <a:srgbClr val="000000"/>
                   </a:solidFill>
@@ -3975,7 +3975,7 @@
             </a:ln>
             <a:extLst>
               <a:ext uri="{91240B29-F687-4f45-9708-019B960494DF}">
-                <a14:hiddenLine xmlns:a14="http://schemas.microsoft.com/office/drawing/2010/main" xmlns="" w="9525">
+                <a14:hiddenLine xmlns="" xmlns:a14="http://schemas.microsoft.com/office/drawing/2010/main" w="9525">
                   <a:solidFill>
                     <a:srgbClr val="000000"/>
                   </a:solidFill>
@@ -4095,7 +4095,7 @@
             </a:ln>
             <a:extLst>
               <a:ext uri="{91240B29-F687-4f45-9708-019B960494DF}">
-                <a14:hiddenLine xmlns:a14="http://schemas.microsoft.com/office/drawing/2010/main" xmlns="" w="9525">
+                <a14:hiddenLine xmlns="" xmlns:a14="http://schemas.microsoft.com/office/drawing/2010/main" w="9525">
                   <a:solidFill>
                     <a:srgbClr val="000000"/>
                   </a:solidFill>
@@ -4163,7 +4163,7 @@
             </a:ln>
             <a:extLst>
               <a:ext uri="{91240B29-F687-4f45-9708-019B960494DF}">
-                <a14:hiddenLine xmlns:a14="http://schemas.microsoft.com/office/drawing/2010/main" xmlns="" w="9525">
+                <a14:hiddenLine xmlns="" xmlns:a14="http://schemas.microsoft.com/office/drawing/2010/main" w="9525">
                   <a:solidFill>
                     <a:srgbClr val="000000"/>
                   </a:solidFill>
@@ -4253,7 +4253,7 @@
             </a:ln>
             <a:extLst>
               <a:ext uri="{91240B29-F687-4f45-9708-019B960494DF}">
-                <a14:hiddenLine xmlns:a14="http://schemas.microsoft.com/office/drawing/2010/main" xmlns="" w="9525">
+                <a14:hiddenLine xmlns="" xmlns:a14="http://schemas.microsoft.com/office/drawing/2010/main" w="9525">
                   <a:solidFill>
                     <a:srgbClr val="000000"/>
                   </a:solidFill>
@@ -8989,7 +8989,7 @@
             <a:alphaModFix amt="30000"/>
             <a:extLst>
               <a:ext uri="{28A0092B-C50C-407E-A947-70E740481C1C}">
-                <a14:useLocalDpi xmlns="" xmlns:a14="http://schemas.microsoft.com/office/drawing/2010/main" val="0"/>
+                <a14:useLocalDpi xmlns:a14="http://schemas.microsoft.com/office/drawing/2010/main" xmlns="" val="0"/>
               </a:ext>
             </a:extLst>
           </a:blip>
@@ -9009,7 +9009,7 @@
           <a:noFill/>
           <a:extLst>
             <a:ext uri="{909E8E84-426E-40dd-AFC4-6F175D3DCCD1}">
-              <a14:hiddenFill xmlns:a14="http://schemas.microsoft.com/office/drawing/2010/main" xmlns="">
+              <a14:hiddenFill xmlns="" xmlns:a14="http://schemas.microsoft.com/office/drawing/2010/main">
                 <a:solidFill>
                   <a:srgbClr val="FFFFFF"/>
                 </a:solidFill>
@@ -9083,7 +9083,7 @@
               </a:ln>
               <a:extLst>
                 <a:ext uri="{91240B29-F687-4f45-9708-019B960494DF}">
-                  <a14:hiddenLine xmlns:a14="http://schemas.microsoft.com/office/drawing/2010/main" xmlns="" w="9525">
+                  <a14:hiddenLine xmlns="" xmlns:a14="http://schemas.microsoft.com/office/drawing/2010/main" w="9525">
                     <a:solidFill>
                       <a:srgbClr val="000000"/>
                     </a:solidFill>
@@ -9173,7 +9173,7 @@
               </a:ln>
               <a:extLst>
                 <a:ext uri="{91240B29-F687-4f45-9708-019B960494DF}">
-                  <a14:hiddenLine xmlns:a14="http://schemas.microsoft.com/office/drawing/2010/main" xmlns="" w="9525">
+                  <a14:hiddenLine xmlns="" xmlns:a14="http://schemas.microsoft.com/office/drawing/2010/main" w="9525">
                     <a:solidFill>
                       <a:srgbClr val="000000"/>
                     </a:solidFill>
@@ -9263,7 +9263,7 @@
               </a:ln>
               <a:extLst>
                 <a:ext uri="{91240B29-F687-4f45-9708-019B960494DF}">
-                  <a14:hiddenLine xmlns:a14="http://schemas.microsoft.com/office/drawing/2010/main" xmlns="" w="9525">
+                  <a14:hiddenLine xmlns="" xmlns:a14="http://schemas.microsoft.com/office/drawing/2010/main" w="9525">
                     <a:solidFill>
                       <a:srgbClr val="000000"/>
                     </a:solidFill>
@@ -9325,7 +9325,7 @@
               </a:ln>
               <a:extLst>
                 <a:ext uri="{91240B29-F687-4f45-9708-019B960494DF}">
-                  <a14:hiddenLine xmlns:a14="http://schemas.microsoft.com/office/drawing/2010/main" xmlns="" w="9525">
+                  <a14:hiddenLine xmlns="" xmlns:a14="http://schemas.microsoft.com/office/drawing/2010/main" w="9525">
                     <a:solidFill>
                       <a:srgbClr val="000000"/>
                     </a:solidFill>
@@ -9415,7 +9415,7 @@
               </a:ln>
               <a:extLst>
                 <a:ext uri="{91240B29-F687-4f45-9708-019B960494DF}">
-                  <a14:hiddenLine xmlns:a14="http://schemas.microsoft.com/office/drawing/2010/main" xmlns="" w="9525">
+                  <a14:hiddenLine xmlns="" xmlns:a14="http://schemas.microsoft.com/office/drawing/2010/main" w="9525">
                     <a:solidFill>
                       <a:srgbClr val="000000"/>
                     </a:solidFill>
@@ -9477,7 +9477,7 @@
               </a:ln>
               <a:extLst>
                 <a:ext uri="{91240B29-F687-4f45-9708-019B960494DF}">
-                  <a14:hiddenLine xmlns:a14="http://schemas.microsoft.com/office/drawing/2010/main" xmlns="" w="9525">
+                  <a14:hiddenLine xmlns="" xmlns:a14="http://schemas.microsoft.com/office/drawing/2010/main" w="9525">
                     <a:solidFill>
                       <a:srgbClr val="000000"/>
                     </a:solidFill>
@@ -9539,7 +9539,7 @@
               </a:ln>
               <a:extLst>
                 <a:ext uri="{91240B29-F687-4f45-9708-019B960494DF}">
-                  <a14:hiddenLine xmlns:a14="http://schemas.microsoft.com/office/drawing/2010/main" xmlns="" w="9525">
+                  <a14:hiddenLine xmlns="" xmlns:a14="http://schemas.microsoft.com/office/drawing/2010/main" w="9525">
                     <a:solidFill>
                       <a:srgbClr val="000000"/>
                     </a:solidFill>
@@ -9629,7 +9629,7 @@
               </a:ln>
               <a:extLst>
                 <a:ext uri="{91240B29-F687-4f45-9708-019B960494DF}">
-                  <a14:hiddenLine xmlns:a14="http://schemas.microsoft.com/office/drawing/2010/main" xmlns="" w="9525">
+                  <a14:hiddenLine xmlns="" xmlns:a14="http://schemas.microsoft.com/office/drawing/2010/main" w="9525">
                     <a:solidFill>
                       <a:srgbClr val="000000"/>
                     </a:solidFill>
@@ -9719,7 +9719,7 @@
               </a:ln>
               <a:extLst>
                 <a:ext uri="{91240B29-F687-4f45-9708-019B960494DF}">
-                  <a14:hiddenLine xmlns:a14="http://schemas.microsoft.com/office/drawing/2010/main" xmlns="" w="9525">
+                  <a14:hiddenLine xmlns="" xmlns:a14="http://schemas.microsoft.com/office/drawing/2010/main" w="9525">
                     <a:solidFill>
                       <a:srgbClr val="000000"/>
                     </a:solidFill>
@@ -9781,7 +9781,7 @@
               </a:ln>
               <a:extLst>
                 <a:ext uri="{91240B29-F687-4f45-9708-019B960494DF}">
-                  <a14:hiddenLine xmlns:a14="http://schemas.microsoft.com/office/drawing/2010/main" xmlns="" w="9525">
+                  <a14:hiddenLine xmlns="" xmlns:a14="http://schemas.microsoft.com/office/drawing/2010/main" w="9525">
                     <a:solidFill>
                       <a:srgbClr val="000000"/>
                     </a:solidFill>
@@ -9891,7 +9891,7 @@
               </a:ln>
               <a:extLst>
                 <a:ext uri="{91240B29-F687-4f45-9708-019B960494DF}">
-                  <a14:hiddenLine xmlns:a14="http://schemas.microsoft.com/office/drawing/2010/main" xmlns="" w="9525">
+                  <a14:hiddenLine xmlns="" xmlns:a14="http://schemas.microsoft.com/office/drawing/2010/main" w="9525">
                     <a:solidFill>
                       <a:srgbClr val="000000"/>
                     </a:solidFill>
@@ -9975,7 +9975,7 @@
               </a:ln>
               <a:extLst>
                 <a:ext uri="{91240B29-F687-4f45-9708-019B960494DF}">
-                  <a14:hiddenLine xmlns:a14="http://schemas.microsoft.com/office/drawing/2010/main" xmlns="" w="9525">
+                  <a14:hiddenLine xmlns="" xmlns:a14="http://schemas.microsoft.com/office/drawing/2010/main" w="9525">
                     <a:solidFill>
                       <a:srgbClr val="000000"/>
                     </a:solidFill>
@@ -10037,7 +10037,7 @@
               </a:ln>
               <a:extLst>
                 <a:ext uri="{91240B29-F687-4f45-9708-019B960494DF}">
-                  <a14:hiddenLine xmlns:a14="http://schemas.microsoft.com/office/drawing/2010/main" xmlns="" w="9525">
+                  <a14:hiddenLine xmlns="" xmlns:a14="http://schemas.microsoft.com/office/drawing/2010/main" w="9525">
                     <a:solidFill>
                       <a:srgbClr val="000000"/>
                     </a:solidFill>
@@ -10099,7 +10099,7 @@
               </a:ln>
               <a:extLst>
                 <a:ext uri="{91240B29-F687-4f45-9708-019B960494DF}">
-                  <a14:hiddenLine xmlns:a14="http://schemas.microsoft.com/office/drawing/2010/main" xmlns="" w="9525">
+                  <a14:hiddenLine xmlns="" xmlns:a14="http://schemas.microsoft.com/office/drawing/2010/main" w="9525">
                     <a:solidFill>
                       <a:srgbClr val="000000"/>
                     </a:solidFill>
@@ -10189,7 +10189,7 @@
               </a:ln>
               <a:extLst>
                 <a:ext uri="{91240B29-F687-4f45-9708-019B960494DF}">
-                  <a14:hiddenLine xmlns:a14="http://schemas.microsoft.com/office/drawing/2010/main" xmlns="" w="9525">
+                  <a14:hiddenLine xmlns="" xmlns:a14="http://schemas.microsoft.com/office/drawing/2010/main" w="9525">
                     <a:solidFill>
                       <a:srgbClr val="000000"/>
                     </a:solidFill>
@@ -10223,7 +10223,7 @@
               </a:ln>
               <a:extLst>
                 <a:ext uri="{91240B29-F687-4f45-9708-019B960494DF}">
-                  <a14:hiddenLine xmlns:a14="http://schemas.microsoft.com/office/drawing/2010/main" xmlns="" w="9525">
+                  <a14:hiddenLine xmlns="" xmlns:a14="http://schemas.microsoft.com/office/drawing/2010/main" w="9525">
                     <a:solidFill>
                       <a:srgbClr val="000000"/>
                     </a:solidFill>
@@ -10288,7 +10288,7 @@
               </a:ln>
               <a:extLst>
                 <a:ext uri="{91240B29-F687-4f45-9708-019B960494DF}">
-                  <a14:hiddenLine xmlns:a14="http://schemas.microsoft.com/office/drawing/2010/main" xmlns="" w="9525">
+                  <a14:hiddenLine xmlns="" xmlns:a14="http://schemas.microsoft.com/office/drawing/2010/main" w="9525">
                     <a:solidFill>
                       <a:srgbClr val="000000"/>
                     </a:solidFill>
@@ -10378,7 +10378,7 @@
               </a:ln>
               <a:extLst>
                 <a:ext uri="{91240B29-F687-4f45-9708-019B960494DF}">
-                  <a14:hiddenLine xmlns:a14="http://schemas.microsoft.com/office/drawing/2010/main" xmlns="" w="9525">
+                  <a14:hiddenLine xmlns="" xmlns:a14="http://schemas.microsoft.com/office/drawing/2010/main" w="9525">
                     <a:solidFill>
                       <a:srgbClr val="000000"/>
                     </a:solidFill>
@@ -10440,7 +10440,7 @@
               </a:ln>
               <a:extLst>
                 <a:ext uri="{91240B29-F687-4f45-9708-019B960494DF}">
-                  <a14:hiddenLine xmlns:a14="http://schemas.microsoft.com/office/drawing/2010/main" xmlns="" w="9525">
+                  <a14:hiddenLine xmlns="" xmlns:a14="http://schemas.microsoft.com/office/drawing/2010/main" w="9525">
                     <a:solidFill>
                       <a:srgbClr val="000000"/>
                     </a:solidFill>
@@ -10530,7 +10530,7 @@
               </a:ln>
               <a:extLst>
                 <a:ext uri="{91240B29-F687-4f45-9708-019B960494DF}">
-                  <a14:hiddenLine xmlns:a14="http://schemas.microsoft.com/office/drawing/2010/main" xmlns="" w="9525">
+                  <a14:hiddenLine xmlns="" xmlns:a14="http://schemas.microsoft.com/office/drawing/2010/main" w="9525">
                     <a:solidFill>
                       <a:srgbClr val="000000"/>
                     </a:solidFill>
@@ -10595,7 +10595,7 @@
               </a:ln>
               <a:extLst>
                 <a:ext uri="{91240B29-F687-4f45-9708-019B960494DF}">
-                  <a14:hiddenLine xmlns:a14="http://schemas.microsoft.com/office/drawing/2010/main" xmlns="" w="9525">
+                  <a14:hiddenLine xmlns="" xmlns:a14="http://schemas.microsoft.com/office/drawing/2010/main" w="9525">
                     <a:solidFill>
                       <a:srgbClr val="000000"/>
                     </a:solidFill>
@@ -10657,7 +10657,7 @@
               </a:ln>
               <a:extLst>
                 <a:ext uri="{91240B29-F687-4f45-9708-019B960494DF}">
-                  <a14:hiddenLine xmlns:a14="http://schemas.microsoft.com/office/drawing/2010/main" xmlns="" w="9525">
+                  <a14:hiddenLine xmlns="" xmlns:a14="http://schemas.microsoft.com/office/drawing/2010/main" w="9525">
                     <a:solidFill>
                       <a:srgbClr val="000000"/>
                     </a:solidFill>
@@ -10747,7 +10747,7 @@
               </a:ln>
               <a:extLst>
                 <a:ext uri="{91240B29-F687-4f45-9708-019B960494DF}">
-                  <a14:hiddenLine xmlns:a14="http://schemas.microsoft.com/office/drawing/2010/main" xmlns="" w="9525">
+                  <a14:hiddenLine xmlns="" xmlns:a14="http://schemas.microsoft.com/office/drawing/2010/main" w="9525">
                     <a:solidFill>
                       <a:srgbClr val="000000"/>
                     </a:solidFill>
@@ -10837,7 +10837,7 @@
               </a:ln>
               <a:extLst>
                 <a:ext uri="{91240B29-F687-4f45-9708-019B960494DF}">
-                  <a14:hiddenLine xmlns:a14="http://schemas.microsoft.com/office/drawing/2010/main" xmlns="" w="9525">
+                  <a14:hiddenLine xmlns="" xmlns:a14="http://schemas.microsoft.com/office/drawing/2010/main" w="9525">
                     <a:solidFill>
                       <a:srgbClr val="000000"/>
                     </a:solidFill>
@@ -10902,7 +10902,7 @@
               </a:ln>
               <a:extLst>
                 <a:ext uri="{91240B29-F687-4f45-9708-019B960494DF}">
-                  <a14:hiddenLine xmlns:a14="http://schemas.microsoft.com/office/drawing/2010/main" xmlns="" w="9525">
+                  <a14:hiddenLine xmlns="" xmlns:a14="http://schemas.microsoft.com/office/drawing/2010/main" w="9525">
                     <a:solidFill>
                       <a:srgbClr val="000000"/>
                     </a:solidFill>
@@ -11022,7 +11022,7 @@
               </a:ln>
               <a:extLst>
                 <a:ext uri="{91240B29-F687-4f45-9708-019B960494DF}">
-                  <a14:hiddenLine xmlns:a14="http://schemas.microsoft.com/office/drawing/2010/main" xmlns="" w="9525">
+                  <a14:hiddenLine xmlns="" xmlns:a14="http://schemas.microsoft.com/office/drawing/2010/main" w="9525">
                     <a:solidFill>
                       <a:srgbClr val="000000"/>
                     </a:solidFill>
@@ -11120,7 +11120,7 @@
               </a:ln>
               <a:extLst>
                 <a:ext uri="{91240B29-F687-4f45-9708-019B960494DF}">
-                  <a14:hiddenLine xmlns:a14="http://schemas.microsoft.com/office/drawing/2010/main" xmlns="" w="9525">
+                  <a14:hiddenLine xmlns="" xmlns:a14="http://schemas.microsoft.com/office/drawing/2010/main" w="9525">
                     <a:solidFill>
                       <a:srgbClr val="000000"/>
                     </a:solidFill>
@@ -11235,7 +11235,7 @@
               </a:ln>
               <a:extLst>
                 <a:ext uri="{91240B29-F687-4f45-9708-019B960494DF}">
-                  <a14:hiddenLine xmlns:a14="http://schemas.microsoft.com/office/drawing/2010/main" xmlns="" w="9525">
+                  <a14:hiddenLine xmlns="" xmlns:a14="http://schemas.microsoft.com/office/drawing/2010/main" w="9525">
                     <a:solidFill>
                       <a:srgbClr val="000000"/>
                     </a:solidFill>
@@ -11325,7 +11325,7 @@
               </a:ln>
               <a:extLst>
                 <a:ext uri="{91240B29-F687-4f45-9708-019B960494DF}">
-                  <a14:hiddenLine xmlns:a14="http://schemas.microsoft.com/office/drawing/2010/main" xmlns="" w="9525">
+                  <a14:hiddenLine xmlns="" xmlns:a14="http://schemas.microsoft.com/office/drawing/2010/main" w="9525">
                     <a:solidFill>
                       <a:srgbClr val="000000"/>
                     </a:solidFill>
@@ -11390,7 +11390,7 @@
               </a:ln>
               <a:extLst>
                 <a:ext uri="{91240B29-F687-4f45-9708-019B960494DF}">
-                  <a14:hiddenLine xmlns:a14="http://schemas.microsoft.com/office/drawing/2010/main" xmlns="" w="9525">
+                  <a14:hiddenLine xmlns="" xmlns:a14="http://schemas.microsoft.com/office/drawing/2010/main" w="9525">
                     <a:solidFill>
                       <a:srgbClr val="000000"/>
                     </a:solidFill>
@@ -11480,7 +11480,7 @@
               </a:ln>
               <a:extLst>
                 <a:ext uri="{91240B29-F687-4f45-9708-019B960494DF}">
-                  <a14:hiddenLine xmlns:a14="http://schemas.microsoft.com/office/drawing/2010/main" xmlns="" w="9525">
+                  <a14:hiddenLine xmlns="" xmlns:a14="http://schemas.microsoft.com/office/drawing/2010/main" w="9525">
                     <a:solidFill>
                       <a:srgbClr val="000000"/>
                     </a:solidFill>
@@ -11548,7 +11548,7 @@
               </a:ln>
               <a:extLst>
                 <a:ext uri="{91240B29-F687-4f45-9708-019B960494DF}">
-                  <a14:hiddenLine xmlns:a14="http://schemas.microsoft.com/office/drawing/2010/main" xmlns="" w="9525">
+                  <a14:hiddenLine xmlns="" xmlns:a14="http://schemas.microsoft.com/office/drawing/2010/main" w="9525">
                     <a:solidFill>
                       <a:srgbClr val="000000"/>
                     </a:solidFill>
@@ -11638,7 +11638,7 @@
               </a:ln>
               <a:extLst>
                 <a:ext uri="{91240B29-F687-4f45-9708-019B960494DF}">
-                  <a14:hiddenLine xmlns:a14="http://schemas.microsoft.com/office/drawing/2010/main" xmlns="" w="9525">
+                  <a14:hiddenLine xmlns="" xmlns:a14="http://schemas.microsoft.com/office/drawing/2010/main" w="9525">
                     <a:solidFill>
                       <a:srgbClr val="000000"/>
                     </a:solidFill>
@@ -11706,7 +11706,7 @@
               </a:ln>
               <a:extLst>
                 <a:ext uri="{91240B29-F687-4f45-9708-019B960494DF}">
-                  <a14:hiddenLine xmlns:a14="http://schemas.microsoft.com/office/drawing/2010/main" xmlns="" w="9525">
+                  <a14:hiddenLine xmlns="" xmlns:a14="http://schemas.microsoft.com/office/drawing/2010/main" w="9525">
                     <a:solidFill>
                       <a:srgbClr val="000000"/>
                     </a:solidFill>
@@ -11796,7 +11796,7 @@
               </a:ln>
               <a:extLst>
                 <a:ext uri="{91240B29-F687-4f45-9708-019B960494DF}">
-                  <a14:hiddenLine xmlns:a14="http://schemas.microsoft.com/office/drawing/2010/main" xmlns="" w="9525">
+                  <a14:hiddenLine xmlns="" xmlns:a14="http://schemas.microsoft.com/office/drawing/2010/main" w="9525">
                     <a:solidFill>
                       <a:srgbClr val="000000"/>
                     </a:solidFill>
@@ -11830,7 +11830,7 @@
               </a:ln>
               <a:extLst>
                 <a:ext uri="{91240B29-F687-4f45-9708-019B960494DF}">
-                  <a14:hiddenLine xmlns:a14="http://schemas.microsoft.com/office/drawing/2010/main" xmlns="" w="9525">
+                  <a14:hiddenLine xmlns="" xmlns:a14="http://schemas.microsoft.com/office/drawing/2010/main" w="9525">
                     <a:solidFill>
                       <a:srgbClr val="000000"/>
                     </a:solidFill>
@@ -12442,7 +12442,7 @@
     </p:spTree>
     <p:extLst>
       <p:ext uri="{BB962C8B-B14F-4D97-AF65-F5344CB8AC3E}">
-        <p14:creationId xmlns="" xmlns:p14="http://schemas.microsoft.com/office/powerpoint/2010/main" val="4209821317"/>
+        <p14:creationId xmlns:p14="http://schemas.microsoft.com/office/powerpoint/2010/main" xmlns="" val="4209821317"/>
       </p:ext>
     </p:extLst>
   </p:cSld>
@@ -12682,7 +12682,7 @@
     </p:spTree>
     <p:extLst>
       <p:ext uri="{BB962C8B-B14F-4D97-AF65-F5344CB8AC3E}">
-        <p14:creationId xmlns="" xmlns:p14="http://schemas.microsoft.com/office/powerpoint/2010/main" val="3205406010"/>
+        <p14:creationId xmlns:p14="http://schemas.microsoft.com/office/powerpoint/2010/main" xmlns="" val="3205406010"/>
       </p:ext>
     </p:extLst>
   </p:cSld>
@@ -12798,7 +12798,7 @@
     </p:spTree>
     <p:extLst>
       <p:ext uri="{BB962C8B-B14F-4D97-AF65-F5344CB8AC3E}">
-        <p14:creationId xmlns="" xmlns:p14="http://schemas.microsoft.com/office/powerpoint/2010/main" val="459454196"/>
+        <p14:creationId xmlns:p14="http://schemas.microsoft.com/office/powerpoint/2010/main" xmlns="" val="459454196"/>
       </p:ext>
     </p:extLst>
   </p:cSld>
@@ -12916,7 +12916,7 @@
         <p:spPr>
           <a:xfrm>
             <a:off x="3425588" y="3244334"/>
-            <a:ext cx="6311024" cy="369332"/>
+            <a:ext cx="6311024" cy="646331"/>
           </a:xfrm>
           <a:prstGeom prst="rect">
             <a:avLst/>
@@ -12929,16 +12929,10 @@
           <a:lstStyle/>
           <a:p>
             <a:r>
-              <a:rPr lang="en-US" dirty="0" smtClean="0">
+              <a:rPr lang="en-US" smtClean="0">
                 <a:hlinkClick r:id="rId2" action="ppaction://hlinkfile"/>
               </a:rPr>
-              <a:t>C:\</a:t>
-            </a:r>
-            <a:r>
-              <a:rPr lang="en-US" dirty="0" smtClean="0">
-                <a:hlinkClick r:id="rId2" action="ppaction://hlinkfile"/>
-              </a:rPr>
-              <a:t>Users\Bailey\Documents\GitHub\Asset-Development\Prezi.exe</a:t>
+              <a:t>C:\Users\Bailey\Documents\GitHub\Asset-Development\gate-of-gabethu535d797e\content</a:t>
             </a:r>
             <a:endParaRPr lang="en-US" dirty="0" smtClean="0"/>
           </a:p>
@@ -12947,7 +12941,7 @@
     </p:spTree>
     <p:extLst>
       <p:ext uri="{BB962C8B-B14F-4D97-AF65-F5344CB8AC3E}">
-        <p14:creationId xmlns="" xmlns:p14="http://schemas.microsoft.com/office/powerpoint/2010/main" val="1934116844"/>
+        <p14:creationId xmlns:p14="http://schemas.microsoft.com/office/powerpoint/2010/main" xmlns="" val="1934116844"/>
       </p:ext>
     </p:extLst>
   </p:cSld>
@@ -13185,7 +13179,7 @@
     </p:spTree>
     <p:extLst>
       <p:ext uri="{BB962C8B-B14F-4D97-AF65-F5344CB8AC3E}">
-        <p14:creationId xmlns="" xmlns:p14="http://schemas.microsoft.com/office/powerpoint/2010/main" val="3092251181"/>
+        <p14:creationId xmlns:p14="http://schemas.microsoft.com/office/powerpoint/2010/main" xmlns="" val="3092251181"/>
       </p:ext>
     </p:extLst>
   </p:cSld>
@@ -13337,7 +13331,7 @@
     </p:spTree>
     <p:extLst>
       <p:ext uri="{BB962C8B-B14F-4D97-AF65-F5344CB8AC3E}">
-        <p14:creationId xmlns="" xmlns:p14="http://schemas.microsoft.com/office/powerpoint/2010/main" val="1067613684"/>
+        <p14:creationId xmlns:p14="http://schemas.microsoft.com/office/powerpoint/2010/main" xmlns="" val="1067613684"/>
       </p:ext>
     </p:extLst>
   </p:cSld>
@@ -13490,7 +13484,7 @@
     </p:spTree>
     <p:extLst>
       <p:ext uri="{BB962C8B-B14F-4D97-AF65-F5344CB8AC3E}">
-        <p14:creationId xmlns="" xmlns:p14="http://schemas.microsoft.com/office/powerpoint/2010/main" val="3028125000"/>
+        <p14:creationId xmlns:p14="http://schemas.microsoft.com/office/powerpoint/2010/main" xmlns="" val="3028125000"/>
       </p:ext>
     </p:extLst>
   </p:cSld>
@@ -13655,7 +13649,7 @@
     </p:spTree>
     <p:extLst>
       <p:ext uri="{BB962C8B-B14F-4D97-AF65-F5344CB8AC3E}">
-        <p14:creationId xmlns="" xmlns:p14="http://schemas.microsoft.com/office/powerpoint/2010/main" val="3028125000"/>
+        <p14:creationId xmlns:p14="http://schemas.microsoft.com/office/powerpoint/2010/main" xmlns="" val="3028125000"/>
       </p:ext>
     </p:extLst>
   </p:cSld>
@@ -13851,7 +13845,7 @@
     </p:spTree>
     <p:extLst>
       <p:ext uri="{BB962C8B-B14F-4D97-AF65-F5344CB8AC3E}">
-        <p14:creationId xmlns="" xmlns:p14="http://schemas.microsoft.com/office/powerpoint/2010/main" val="3999698565"/>
+        <p14:creationId xmlns:p14="http://schemas.microsoft.com/office/powerpoint/2010/main" xmlns="" val="3999698565"/>
       </p:ext>
     </p:extLst>
   </p:cSld>
@@ -14113,7 +14107,7 @@
   <a:extraClrSchemeLst/>
   <a:extLst>
     <a:ext uri="{05A4C25C-085E-4340-85A3-A5531E510DB2}">
-      <thm15:themeFamily xmlns="" xmlns:thm15="http://schemas.microsoft.com/office/thememl/2012/main" name="Circuit" id="{0AC2F7E7-15F5-431C-B2A2-456FE929F56C}" vid="{0911B802-464C-4241-8DD9-B60FF88E379F}"/>
+      <thm15:themeFamily xmlns:thm15="http://schemas.microsoft.com/office/thememl/2012/main" xmlns="" name="Circuit" id="{0AC2F7E7-15F5-431C-B2A2-456FE929F56C}" vid="{0911B802-464C-4241-8DD9-B60FF88E379F}"/>
     </a:ext>
   </a:extLst>
 </a:theme>

</xml_diff>